<commit_message>
Done mid time presentation and quick fixes to design for the worker exchange
</commit_message>
<xml_diff>
--- a/Mid-time project presentation.pptx
+++ b/Mid-time project presentation.pptx
@@ -21,30 +21,29 @@
     <p:sldId id="266" r:id="rId16"/>
     <p:sldId id="267" r:id="rId17"/>
     <p:sldId id="268" r:id="rId18"/>
-    <p:sldId id="269" r:id="rId19"/>
   </p:sldIdLst>
   <p:sldSz cy="5143500" cx="9144000"/>
   <p:notesSz cx="6858000" cy="9144000"/>
   <p:embeddedFontLst>
     <p:embeddedFont>
       <p:font typeface="Lexend ExtraBold"/>
-      <p:bold r:id="rId20"/>
+      <p:bold r:id="rId19"/>
     </p:embeddedFont>
     <p:embeddedFont>
       <p:font typeface="Nunito"/>
-      <p:regular r:id="rId21"/>
-      <p:bold r:id="rId22"/>
-      <p:italic r:id="rId23"/>
-      <p:boldItalic r:id="rId24"/>
+      <p:regular r:id="rId20"/>
+      <p:bold r:id="rId21"/>
+      <p:italic r:id="rId22"/>
+      <p:boldItalic r:id="rId23"/>
     </p:embeddedFont>
     <p:embeddedFont>
       <p:font typeface="Maven Pro"/>
-      <p:regular r:id="rId25"/>
-      <p:bold r:id="rId26"/>
+      <p:regular r:id="rId24"/>
+      <p:bold r:id="rId25"/>
     </p:embeddedFont>
     <p:embeddedFont>
       <p:font typeface="Maven Pro ExtraBold"/>
-      <p:bold r:id="rId27"/>
+      <p:bold r:id="rId26"/>
     </p:embeddedFont>
   </p:embeddedFontLst>
   <p:defaultTextStyle>
@@ -825,7 +824,7 @@
   <p:cSld>
     <p:spTree>
       <p:nvGrpSpPr>
-        <p:cNvPr id="334" name="Shape 334"/>
+        <p:cNvPr id="339" name="Shape 339"/>
         <p:cNvGrpSpPr/>
         <p:nvPr/>
       </p:nvGrpSpPr>
@@ -839,7 +838,7 @@
       </p:grpSpPr>
       <p:sp>
         <p:nvSpPr>
-          <p:cNvPr id="335" name="Google Shape;335;g3167eee102e_0_288:notes"/>
+          <p:cNvPr id="340" name="Google Shape;340;g3167eee102e_0_329:notes"/>
           <p:cNvSpPr/>
           <p:nvPr>
             <p:ph idx="2" type="sldImg"/>
@@ -874,7 +873,7 @@
       </p:sp>
       <p:sp>
         <p:nvSpPr>
-          <p:cNvPr id="336" name="Google Shape;336;g3167eee102e_0_288:notes"/>
+          <p:cNvPr id="341" name="Google Shape;341;g3167eee102e_0_329:notes"/>
           <p:cNvSpPr txBox="1"/>
           <p:nvPr>
             <p:ph idx="1" type="body"/>
@@ -924,7 +923,7 @@
   <p:cSld>
     <p:spTree>
       <p:nvGrpSpPr>
-        <p:cNvPr id="344" name="Shape 344"/>
+        <p:cNvPr id="348" name="Shape 348"/>
         <p:cNvGrpSpPr/>
         <p:nvPr/>
       </p:nvGrpSpPr>
@@ -938,7 +937,7 @@
       </p:grpSpPr>
       <p:sp>
         <p:nvSpPr>
-          <p:cNvPr id="345" name="Google Shape;345;g3167eee102e_0_329:notes"/>
+          <p:cNvPr id="349" name="Google Shape;349;g3167eee102e_0_350:notes"/>
           <p:cNvSpPr/>
           <p:nvPr>
             <p:ph idx="2" type="sldImg"/>
@@ -973,7 +972,7 @@
       </p:sp>
       <p:sp>
         <p:nvSpPr>
-          <p:cNvPr id="346" name="Google Shape;346;g3167eee102e_0_329:notes"/>
+          <p:cNvPr id="350" name="Google Shape;350;g3167eee102e_0_350:notes"/>
           <p:cNvSpPr txBox="1"/>
           <p:nvPr>
             <p:ph idx="1" type="body"/>
@@ -1023,7 +1022,7 @@
   <p:cSld>
     <p:spTree>
       <p:nvGrpSpPr>
-        <p:cNvPr id="353" name="Shape 353"/>
+        <p:cNvPr id="355" name="Shape 355"/>
         <p:cNvGrpSpPr/>
         <p:nvPr/>
       </p:nvGrpSpPr>
@@ -1037,7 +1036,7 @@
       </p:grpSpPr>
       <p:sp>
         <p:nvSpPr>
-          <p:cNvPr id="354" name="Google Shape;354;g3167eee102e_0_350:notes"/>
+          <p:cNvPr id="356" name="Google Shape;356;g3167eee102e_0_366:notes"/>
           <p:cNvSpPr/>
           <p:nvPr>
             <p:ph idx="2" type="sldImg"/>
@@ -1072,7 +1071,7 @@
       </p:sp>
       <p:sp>
         <p:nvSpPr>
-          <p:cNvPr id="355" name="Google Shape;355;g3167eee102e_0_350:notes"/>
+          <p:cNvPr id="357" name="Google Shape;357;g3167eee102e_0_366:notes"/>
           <p:cNvSpPr txBox="1"/>
           <p:nvPr>
             <p:ph idx="1" type="body"/>
@@ -1122,7 +1121,7 @@
   <p:cSld>
     <p:spTree>
       <p:nvGrpSpPr>
-        <p:cNvPr id="360" name="Shape 360"/>
+        <p:cNvPr id="361" name="Shape 361"/>
         <p:cNvGrpSpPr/>
         <p:nvPr/>
       </p:nvGrpSpPr>
@@ -1136,7 +1135,7 @@
       </p:grpSpPr>
       <p:sp>
         <p:nvSpPr>
-          <p:cNvPr id="361" name="Google Shape;361;g3167eee102e_0_366:notes"/>
+          <p:cNvPr id="362" name="Google Shape;362;g3167eee102e_0_374:notes"/>
           <p:cNvSpPr/>
           <p:nvPr>
             <p:ph idx="2" type="sldImg"/>
@@ -1171,106 +1170,7 @@
       </p:sp>
       <p:sp>
         <p:nvSpPr>
-          <p:cNvPr id="362" name="Google Shape;362;g3167eee102e_0_366:notes"/>
-          <p:cNvSpPr txBox="1"/>
-          <p:nvPr>
-            <p:ph idx="1" type="body"/>
-          </p:nvPr>
-        </p:nvSpPr>
-        <p:spPr>
-          <a:xfrm>
-            <a:off x="685800" y="4343400"/>
-            <a:ext cx="5486400" cy="4114800"/>
-          </a:xfrm>
-          <a:prstGeom prst="rect">
-            <a:avLst/>
-          </a:prstGeom>
-        </p:spPr>
-        <p:txBody>
-          <a:bodyPr anchorCtr="0" anchor="t" bIns="91425" lIns="91425" spcFirstLastPara="1" rIns="91425" wrap="square" tIns="91425">
-            <a:noAutofit/>
-          </a:bodyPr>
-          <a:lstStyle/>
-          <a:p>
-            <a:pPr indent="0" lvl="0" marL="0" rtl="0" algn="l">
-              <a:spcBef>
-                <a:spcPts val="0"/>
-              </a:spcBef>
-              <a:spcAft>
-                <a:spcPts val="0"/>
-              </a:spcAft>
-              <a:buNone/>
-            </a:pPr>
-            <a:r>
-              <a:t/>
-            </a:r>
-            <a:endParaRPr/>
-          </a:p>
-        </p:txBody>
-      </p:sp>
-    </p:spTree>
-  </p:cSld>
-  <p:clrMapOvr>
-    <a:masterClrMapping/>
-  </p:clrMapOvr>
-</p:notes>
-</file>
-
-<file path=ppt/notesSlides/notesSlide14.xml><?xml version="1.0" encoding="utf-8"?>
-<p:notes xmlns:a="http://schemas.openxmlformats.org/drawingml/2006/main" xmlns:r="http://schemas.openxmlformats.org/officeDocument/2006/relationships" xmlns:mc="http://schemas.openxmlformats.org/markup-compatibility/2006" xmlns:mv="urn:schemas-microsoft-com:mac:vml" xmlns:p="http://schemas.openxmlformats.org/presentationml/2006/main" xmlns:c="http://schemas.openxmlformats.org/drawingml/2006/chart" xmlns:dgm="http://schemas.openxmlformats.org/drawingml/2006/diagram" xmlns:o="urn:schemas-microsoft-com:office:office" xmlns:v="urn:schemas-microsoft-com:vml" xmlns:pvml="urn:schemas-microsoft-com:office:powerpoint" xmlns:com="http://schemas.openxmlformats.org/drawingml/2006/compatibility" xmlns:p14="http://schemas.microsoft.com/office/powerpoint/2010/main" xmlns:p15="http://schemas.microsoft.com/office/powerpoint/2012/main" xmlns:ahyp="http://schemas.microsoft.com/office/drawing/2018/hyperlinkcolor" showMasterPhAnim="0" showMasterSp="0">
-  <p:cSld>
-    <p:spTree>
-      <p:nvGrpSpPr>
-        <p:cNvPr id="366" name="Shape 366"/>
-        <p:cNvGrpSpPr/>
-        <p:nvPr/>
-      </p:nvGrpSpPr>
-      <p:grpSpPr>
-        <a:xfrm>
-          <a:off x="0" y="0"/>
-          <a:ext cx="0" cy="0"/>
-          <a:chOff x="0" y="0"/>
-          <a:chExt cx="0" cy="0"/>
-        </a:xfrm>
-      </p:grpSpPr>
-      <p:sp>
-        <p:nvSpPr>
-          <p:cNvPr id="367" name="Google Shape;367;g3167eee102e_0_374:notes"/>
-          <p:cNvSpPr/>
-          <p:nvPr>
-            <p:ph idx="2" type="sldImg"/>
-          </p:nvPr>
-        </p:nvSpPr>
-        <p:spPr>
-          <a:xfrm>
-            <a:off x="381300" y="685800"/>
-            <a:ext cx="6096000" cy="3429000"/>
-          </a:xfrm>
-          <a:custGeom>
-            <a:rect b="b" l="l" r="r" t="t"/>
-            <a:pathLst>
-              <a:path extrusionOk="0" h="120000" w="120000">
-                <a:moveTo>
-                  <a:pt x="0" y="0"/>
-                </a:moveTo>
-                <a:lnTo>
-                  <a:pt x="120000" y="0"/>
-                </a:lnTo>
-                <a:lnTo>
-                  <a:pt x="120000" y="120000"/>
-                </a:lnTo>
-                <a:lnTo>
-                  <a:pt x="0" y="120000"/>
-                </a:lnTo>
-                <a:close/>
-              </a:path>
-            </a:pathLst>
-          </a:custGeom>
-        </p:spPr>
-      </p:sp>
-      <p:sp>
-        <p:nvSpPr>
-          <p:cNvPr id="368" name="Google Shape;368;g3167eee102e_0_374:notes"/>
+          <p:cNvPr id="363" name="Google Shape;363;g3167eee102e_0_374:notes"/>
           <p:cNvSpPr txBox="1"/>
           <p:nvPr>
             <p:ph idx="1" type="body"/>
@@ -1419,7 +1319,7 @@
   <p:cSld>
     <p:spTree>
       <p:nvGrpSpPr>
-        <p:cNvPr id="286" name="Shape 286"/>
+        <p:cNvPr id="287" name="Shape 287"/>
         <p:cNvGrpSpPr/>
         <p:nvPr/>
       </p:nvGrpSpPr>
@@ -1433,7 +1333,7 @@
       </p:grpSpPr>
       <p:sp>
         <p:nvSpPr>
-          <p:cNvPr id="287" name="Google Shape;287;g3167eee102e_0_389:notes"/>
+          <p:cNvPr id="288" name="Google Shape;288;g3167eee102e_0_389:notes"/>
           <p:cNvSpPr/>
           <p:nvPr>
             <p:ph idx="2" type="sldImg"/>
@@ -1468,7 +1368,7 @@
       </p:sp>
       <p:sp>
         <p:nvSpPr>
-          <p:cNvPr id="288" name="Google Shape;288;g3167eee102e_0_389:notes"/>
+          <p:cNvPr id="289" name="Google Shape;289;g3167eee102e_0_389:notes"/>
           <p:cNvSpPr txBox="1"/>
           <p:nvPr>
             <p:ph idx="1" type="body"/>
@@ -1518,7 +1418,7 @@
   <p:cSld>
     <p:spTree>
       <p:nvGrpSpPr>
-        <p:cNvPr id="292" name="Shape 292"/>
+        <p:cNvPr id="293" name="Shape 293"/>
         <p:cNvGrpSpPr/>
         <p:nvPr/>
       </p:nvGrpSpPr>
@@ -1532,7 +1432,7 @@
       </p:grpSpPr>
       <p:sp>
         <p:nvSpPr>
-          <p:cNvPr id="293" name="Google Shape;293;g3167eee102e_0_273:notes"/>
+          <p:cNvPr id="294" name="Google Shape;294;g3167eee102e_0_273:notes"/>
           <p:cNvSpPr/>
           <p:nvPr>
             <p:ph idx="2" type="sldImg"/>
@@ -1567,7 +1467,7 @@
       </p:sp>
       <p:sp>
         <p:nvSpPr>
-          <p:cNvPr id="294" name="Google Shape;294;g3167eee102e_0_273:notes"/>
+          <p:cNvPr id="295" name="Google Shape;295;g3167eee102e_0_273:notes"/>
           <p:cNvSpPr txBox="1"/>
           <p:nvPr>
             <p:ph idx="1" type="body"/>
@@ -1617,7 +1517,7 @@
   <p:cSld>
     <p:spTree>
       <p:nvGrpSpPr>
-        <p:cNvPr id="298" name="Shape 298"/>
+        <p:cNvPr id="299" name="Shape 299"/>
         <p:cNvGrpSpPr/>
         <p:nvPr/>
       </p:nvGrpSpPr>
@@ -1631,7 +1531,7 @@
       </p:grpSpPr>
       <p:sp>
         <p:nvSpPr>
-          <p:cNvPr id="299" name="Google Shape;299;g3167eee102e_0_379:notes"/>
+          <p:cNvPr id="300" name="Google Shape;300;g3167eee102e_0_379:notes"/>
           <p:cNvSpPr/>
           <p:nvPr>
             <p:ph idx="2" type="sldImg"/>
@@ -1666,7 +1566,7 @@
       </p:sp>
       <p:sp>
         <p:nvSpPr>
-          <p:cNvPr id="300" name="Google Shape;300;g3167eee102e_0_379:notes"/>
+          <p:cNvPr id="301" name="Google Shape;301;g3167eee102e_0_379:notes"/>
           <p:cNvSpPr txBox="1"/>
           <p:nvPr>
             <p:ph idx="1" type="body"/>
@@ -1716,7 +1616,7 @@
   <p:cSld>
     <p:spTree>
       <p:nvGrpSpPr>
-        <p:cNvPr id="305" name="Shape 305"/>
+        <p:cNvPr id="306" name="Shape 306"/>
         <p:cNvGrpSpPr/>
         <p:nvPr/>
       </p:nvGrpSpPr>
@@ -1730,7 +1630,7 @@
       </p:grpSpPr>
       <p:sp>
         <p:nvSpPr>
-          <p:cNvPr id="306" name="Google Shape;306;g3167eee102e_0_278:notes"/>
+          <p:cNvPr id="307" name="Google Shape;307;g3167eee102e_0_283:notes"/>
           <p:cNvSpPr/>
           <p:nvPr>
             <p:ph idx="2" type="sldImg"/>
@@ -1765,7 +1665,7 @@
       </p:sp>
       <p:sp>
         <p:nvSpPr>
-          <p:cNvPr id="307" name="Google Shape;307;g3167eee102e_0_278:notes"/>
+          <p:cNvPr id="308" name="Google Shape;308;g3167eee102e_0_283:notes"/>
           <p:cNvSpPr txBox="1"/>
           <p:nvPr>
             <p:ph idx="1" type="body"/>
@@ -1815,7 +1715,7 @@
   <p:cSld>
     <p:spTree>
       <p:nvGrpSpPr>
-        <p:cNvPr id="314" name="Shape 314"/>
+        <p:cNvPr id="313" name="Shape 313"/>
         <p:cNvGrpSpPr/>
         <p:nvPr/>
       </p:nvGrpSpPr>
@@ -1829,7 +1729,7 @@
       </p:grpSpPr>
       <p:sp>
         <p:nvSpPr>
-          <p:cNvPr id="315" name="Google Shape;315;g3167eee102e_0_283:notes"/>
+          <p:cNvPr id="314" name="Google Shape;314;g3167eee102e_0_278:notes"/>
           <p:cNvSpPr/>
           <p:nvPr>
             <p:ph idx="2" type="sldImg"/>
@@ -1864,7 +1764,7 @@
       </p:sp>
       <p:sp>
         <p:nvSpPr>
-          <p:cNvPr id="316" name="Google Shape;316;g3167eee102e_0_283:notes"/>
+          <p:cNvPr id="315" name="Google Shape;315;g3167eee102e_0_278:notes"/>
           <p:cNvSpPr txBox="1"/>
           <p:nvPr>
             <p:ph idx="1" type="body"/>
@@ -1914,7 +1814,7 @@
   <p:cSld>
     <p:spTree>
       <p:nvGrpSpPr>
-        <p:cNvPr id="320" name="Shape 320"/>
+        <p:cNvPr id="322" name="Shape 322"/>
         <p:cNvGrpSpPr/>
         <p:nvPr/>
       </p:nvGrpSpPr>
@@ -1928,7 +1828,7 @@
       </p:grpSpPr>
       <p:sp>
         <p:nvSpPr>
-          <p:cNvPr id="321" name="Google Shape;321;g3182cd997bd_0_15:notes"/>
+          <p:cNvPr id="323" name="Google Shape;323;g3167eee102e_0_298:notes"/>
           <p:cNvSpPr/>
           <p:nvPr>
             <p:ph idx="2" type="sldImg"/>
@@ -1963,7 +1863,7 @@
       </p:sp>
       <p:sp>
         <p:nvSpPr>
-          <p:cNvPr id="322" name="Google Shape;322;g3182cd997bd_0_15:notes"/>
+          <p:cNvPr id="324" name="Google Shape;324;g3167eee102e_0_298:notes"/>
           <p:cNvSpPr txBox="1"/>
           <p:nvPr>
             <p:ph idx="1" type="body"/>
@@ -2013,7 +1913,7 @@
   <p:cSld>
     <p:spTree>
       <p:nvGrpSpPr>
-        <p:cNvPr id="327" name="Shape 327"/>
+        <p:cNvPr id="329" name="Shape 329"/>
         <p:cNvGrpSpPr/>
         <p:nvPr/>
       </p:nvGrpSpPr>
@@ -2027,7 +1927,7 @@
       </p:grpSpPr>
       <p:sp>
         <p:nvSpPr>
-          <p:cNvPr id="328" name="Google Shape;328;g3167eee102e_0_298:notes"/>
+          <p:cNvPr id="330" name="Google Shape;330;g3167eee102e_0_288:notes"/>
           <p:cNvSpPr/>
           <p:nvPr>
             <p:ph idx="2" type="sldImg"/>
@@ -2062,7 +1962,7 @@
       </p:sp>
       <p:sp>
         <p:nvSpPr>
-          <p:cNvPr id="329" name="Google Shape;329;g3167eee102e_0_298:notes"/>
+          <p:cNvPr id="331" name="Google Shape;331;g3167eee102e_0_288:notes"/>
           <p:cNvSpPr txBox="1"/>
           <p:nvPr>
             <p:ph idx="1" type="body"/>
@@ -16609,369 +16509,7 @@
   <p:cSld>
     <p:spTree>
       <p:nvGrpSpPr>
-        <p:cNvPr id="337" name="Shape 337"/>
-        <p:cNvGrpSpPr/>
-        <p:nvPr/>
-      </p:nvGrpSpPr>
-      <p:grpSpPr>
-        <a:xfrm>
-          <a:off x="0" y="0"/>
-          <a:ext cx="0" cy="0"/>
-          <a:chOff x="0" y="0"/>
-          <a:chExt cx="0" cy="0"/>
-        </a:xfrm>
-      </p:grpSpPr>
-      <p:pic>
-        <p:nvPicPr>
-          <p:cNvPr id="338" name="Google Shape;338;p22"/>
-          <p:cNvPicPr preferRelativeResize="0"/>
-          <p:nvPr/>
-        </p:nvPicPr>
-        <p:blipFill>
-          <a:blip r:embed="rId3">
-            <a:alphaModFix/>
-          </a:blip>
-          <a:stretch>
-            <a:fillRect/>
-          </a:stretch>
-        </p:blipFill>
-        <p:spPr>
-          <a:xfrm>
-            <a:off x="111788" y="517725"/>
-            <a:ext cx="1762125" cy="1028700"/>
-          </a:xfrm>
-          <a:prstGeom prst="rect">
-            <a:avLst/>
-          </a:prstGeom>
-          <a:noFill/>
-          <a:ln>
-            <a:noFill/>
-          </a:ln>
-        </p:spPr>
-      </p:pic>
-      <p:sp>
-        <p:nvSpPr>
-          <p:cNvPr id="339" name="Google Shape;339;p22"/>
-          <p:cNvSpPr txBox="1"/>
-          <p:nvPr>
-            <p:ph type="title"/>
-          </p:nvPr>
-        </p:nvSpPr>
-        <p:spPr>
-          <a:xfrm>
-            <a:off x="428075" y="598575"/>
-            <a:ext cx="4294200" cy="999300"/>
-          </a:xfrm>
-          <a:prstGeom prst="rect">
-            <a:avLst/>
-          </a:prstGeom>
-        </p:spPr>
-        <p:txBody>
-          <a:bodyPr anchorCtr="0" anchor="t" bIns="91425" lIns="91425" spcFirstLastPara="1" rIns="91425" wrap="square" tIns="91425">
-            <a:normAutofit/>
-          </a:bodyPr>
-          <a:lstStyle/>
-          <a:p>
-            <a:pPr indent="0" lvl="0" marL="0" rtl="0" algn="l">
-              <a:spcBef>
-                <a:spcPts val="0"/>
-              </a:spcBef>
-              <a:spcAft>
-                <a:spcPts val="0"/>
-              </a:spcAft>
-              <a:buNone/>
-            </a:pPr>
-            <a:r>
-              <a:rPr lang="fr" sz="2600">
-                <a:solidFill>
-                  <a:srgbClr val="0000FF"/>
-                </a:solidFill>
-              </a:rPr>
-              <a:t>Master Design Details</a:t>
-            </a:r>
-            <a:endParaRPr sz="2600">
-              <a:solidFill>
-                <a:srgbClr val="0000FF"/>
-              </a:solidFill>
-            </a:endParaRPr>
-          </a:p>
-        </p:txBody>
-      </p:sp>
-      <p:sp>
-        <p:nvSpPr>
-          <p:cNvPr id="340" name="Google Shape;340;p22"/>
-          <p:cNvSpPr txBox="1"/>
-          <p:nvPr>
-            <p:ph idx="1" type="body"/>
-          </p:nvPr>
-        </p:nvSpPr>
-        <p:spPr>
-          <a:xfrm>
-            <a:off x="428075" y="1990050"/>
-            <a:ext cx="3473700" cy="2541600"/>
-          </a:xfrm>
-          <a:prstGeom prst="rect">
-            <a:avLst/>
-          </a:prstGeom>
-        </p:spPr>
-        <p:txBody>
-          <a:bodyPr anchorCtr="0" anchor="t" bIns="91425" lIns="91425" spcFirstLastPara="1" rIns="91425" wrap="square" tIns="91425">
-            <a:normAutofit lnSpcReduction="10000"/>
-          </a:bodyPr>
-          <a:lstStyle/>
-          <a:p>
-            <a:pPr indent="0" lvl="0" marL="0" rtl="0" algn="l">
-              <a:spcBef>
-                <a:spcPts val="0"/>
-              </a:spcBef>
-              <a:spcAft>
-                <a:spcPts val="0"/>
-              </a:spcAft>
-              <a:buNone/>
-            </a:pPr>
-            <a:r>
-              <a:rPr lang="fr"/>
-              <a:t>Current progress: </a:t>
-            </a:r>
-            <a:endParaRPr/>
-          </a:p>
-          <a:p>
-            <a:pPr indent="-311150" lvl="0" marL="457200" rtl="0" algn="l">
-              <a:spcBef>
-                <a:spcPts val="1200"/>
-              </a:spcBef>
-              <a:spcAft>
-                <a:spcPts val="0"/>
-              </a:spcAft>
-              <a:buSzPts val="1300"/>
-              <a:buChar char="●"/>
-            </a:pPr>
-            <a:r>
-              <a:rPr lang="fr"/>
-              <a:t>Coding for communication is done, but we need to finish the connection to be established with the workers to debug and implement the role according to our design.</a:t>
-            </a:r>
-            <a:endParaRPr/>
-          </a:p>
-          <a:p>
-            <a:pPr indent="0" lvl="0" marL="0" rtl="0" algn="l">
-              <a:spcBef>
-                <a:spcPts val="1200"/>
-              </a:spcBef>
-              <a:spcAft>
-                <a:spcPts val="0"/>
-              </a:spcAft>
-              <a:buNone/>
-            </a:pPr>
-            <a:r>
-              <a:t/>
-            </a:r>
-            <a:endParaRPr/>
-          </a:p>
-          <a:p>
-            <a:pPr indent="0" lvl="0" marL="0" rtl="0" algn="l">
-              <a:spcBef>
-                <a:spcPts val="1200"/>
-              </a:spcBef>
-              <a:spcAft>
-                <a:spcPts val="1200"/>
-              </a:spcAft>
-              <a:buNone/>
-            </a:pPr>
-            <a:r>
-              <a:rPr lang="fr"/>
-              <a:t>Question: is the </a:t>
-            </a:r>
-            <a:r>
-              <a:rPr lang="fr" u="sng"/>
-              <a:t>master our computer</a:t>
-            </a:r>
-            <a:r>
-              <a:rPr lang="fr"/>
-              <a:t> or one of the machines? </a:t>
-            </a:r>
-            <a:endParaRPr/>
-          </a:p>
-        </p:txBody>
-      </p:sp>
-      <p:sp>
-        <p:nvSpPr>
-          <p:cNvPr id="341" name="Google Shape;341;p22"/>
-          <p:cNvSpPr txBox="1"/>
-          <p:nvPr>
-            <p:ph idx="1" type="body"/>
-          </p:nvPr>
-        </p:nvSpPr>
-        <p:spPr>
-          <a:xfrm>
-            <a:off x="4572000" y="1990050"/>
-            <a:ext cx="4294200" cy="2541600"/>
-          </a:xfrm>
-          <a:prstGeom prst="rect">
-            <a:avLst/>
-          </a:prstGeom>
-        </p:spPr>
-        <p:txBody>
-          <a:bodyPr anchorCtr="0" anchor="t" bIns="91425" lIns="91425" spcFirstLastPara="1" rIns="91425" wrap="square" tIns="91425">
-            <a:normAutofit/>
-          </a:bodyPr>
-          <a:lstStyle/>
-          <a:p>
-            <a:pPr indent="0" lvl="0" marL="0" rtl="0" algn="l">
-              <a:spcBef>
-                <a:spcPts val="0"/>
-              </a:spcBef>
-              <a:spcAft>
-                <a:spcPts val="0"/>
-              </a:spcAft>
-              <a:buNone/>
-            </a:pPr>
-            <a:r>
-              <a:rPr lang="fr"/>
-              <a:t>Expected worker responsibilities:</a:t>
-            </a:r>
-            <a:endParaRPr/>
-          </a:p>
-          <a:p>
-            <a:pPr indent="-311150" lvl="0" marL="457200" rtl="0" algn="l">
-              <a:spcBef>
-                <a:spcPts val="1200"/>
-              </a:spcBef>
-              <a:spcAft>
-                <a:spcPts val="0"/>
-              </a:spcAft>
-              <a:buSzPts val="1300"/>
-              <a:buChar char="●"/>
-            </a:pPr>
-            <a:r>
-              <a:rPr lang="fr"/>
-              <a:t>Presorting and sorting data</a:t>
-            </a:r>
-            <a:endParaRPr/>
-          </a:p>
-          <a:p>
-            <a:pPr indent="-311150" lvl="0" marL="457200" rtl="0" algn="l">
-              <a:spcBef>
-                <a:spcPts val="0"/>
-              </a:spcBef>
-              <a:spcAft>
-                <a:spcPts val="0"/>
-              </a:spcAft>
-              <a:buSzPts val="1300"/>
-              <a:buChar char="●"/>
-            </a:pPr>
-            <a:r>
-              <a:rPr lang="fr"/>
-              <a:t>Exchanging data with other workers</a:t>
-            </a:r>
-            <a:endParaRPr/>
-          </a:p>
-          <a:p>
-            <a:pPr indent="-311150" lvl="0" marL="457200" rtl="0" algn="l">
-              <a:spcBef>
-                <a:spcPts val="0"/>
-              </a:spcBef>
-              <a:spcAft>
-                <a:spcPts val="0"/>
-              </a:spcAft>
-              <a:buSzPts val="1300"/>
-              <a:buChar char="●"/>
-            </a:pPr>
-            <a:r>
-              <a:rPr lang="fr"/>
-              <a:t>Give feedback to master when finishing every step</a:t>
-            </a:r>
-            <a:endParaRPr/>
-          </a:p>
-        </p:txBody>
-      </p:sp>
-      <p:sp>
-        <p:nvSpPr>
-          <p:cNvPr id="342" name="Google Shape;342;p22"/>
-          <p:cNvSpPr txBox="1"/>
-          <p:nvPr>
-            <p:ph type="title"/>
-          </p:nvPr>
-        </p:nvSpPr>
-        <p:spPr>
-          <a:xfrm>
-            <a:off x="4572000" y="598575"/>
-            <a:ext cx="4294200" cy="999300"/>
-          </a:xfrm>
-          <a:prstGeom prst="rect">
-            <a:avLst/>
-          </a:prstGeom>
-        </p:spPr>
-        <p:txBody>
-          <a:bodyPr anchorCtr="0" anchor="t" bIns="91425" lIns="91425" spcFirstLastPara="1" rIns="91425" wrap="square" tIns="91425">
-            <a:normAutofit/>
-          </a:bodyPr>
-          <a:lstStyle/>
-          <a:p>
-            <a:pPr indent="0" lvl="0" marL="0" rtl="0" algn="l">
-              <a:spcBef>
-                <a:spcPts val="0"/>
-              </a:spcBef>
-              <a:spcAft>
-                <a:spcPts val="0"/>
-              </a:spcAft>
-              <a:buNone/>
-            </a:pPr>
-            <a:r>
-              <a:rPr lang="fr" sz="2600">
-                <a:solidFill>
-                  <a:srgbClr val="0000FF"/>
-                </a:solidFill>
-              </a:rPr>
-              <a:t>Worker Design Details:</a:t>
-            </a:r>
-            <a:endParaRPr sz="2600">
-              <a:solidFill>
-                <a:srgbClr val="0000FF"/>
-              </a:solidFill>
-            </a:endParaRPr>
-          </a:p>
-        </p:txBody>
-      </p:sp>
-      <p:cxnSp>
-        <p:nvCxnSpPr>
-          <p:cNvPr id="343" name="Google Shape;343;p22"/>
-          <p:cNvCxnSpPr/>
-          <p:nvPr/>
-        </p:nvCxnSpPr>
-        <p:spPr>
-          <a:xfrm>
-            <a:off x="4327700" y="472900"/>
-            <a:ext cx="33600" cy="4157400"/>
-          </a:xfrm>
-          <a:prstGeom prst="straightConnector1">
-            <a:avLst/>
-          </a:prstGeom>
-          <a:noFill/>
-          <a:ln cap="flat" cmpd="sng" w="9525">
-            <a:solidFill>
-              <a:schemeClr val="dk2"/>
-            </a:solidFill>
-            <a:prstDash val="solid"/>
-            <a:round/>
-            <a:headEnd len="med" w="med" type="none"/>
-            <a:tailEnd len="med" w="med" type="none"/>
-          </a:ln>
-        </p:spPr>
-      </p:cxnSp>
-    </p:spTree>
-  </p:cSld>
-  <p:clrMapOvr>
-    <a:masterClrMapping/>
-  </p:clrMapOvr>
-</p:sld>
-</file>
-
-<file path=ppt/slides/slide11.xml><?xml version="1.0" encoding="utf-8"?>
-<p:sld xmlns:a="http://schemas.openxmlformats.org/drawingml/2006/main" xmlns:r="http://schemas.openxmlformats.org/officeDocument/2006/relationships" xmlns:mc="http://schemas.openxmlformats.org/markup-compatibility/2006" xmlns:mv="urn:schemas-microsoft-com:mac:vml" xmlns:p="http://schemas.openxmlformats.org/presentationml/2006/main" xmlns:c="http://schemas.openxmlformats.org/drawingml/2006/chart" xmlns:dgm="http://schemas.openxmlformats.org/drawingml/2006/diagram" xmlns:o="urn:schemas-microsoft-com:office:office" xmlns:v="urn:schemas-microsoft-com:vml" xmlns:pvml="urn:schemas-microsoft-com:office:powerpoint" xmlns:com="http://schemas.openxmlformats.org/drawingml/2006/compatibility" xmlns:p14="http://schemas.microsoft.com/office/powerpoint/2010/main" xmlns:p15="http://schemas.microsoft.com/office/powerpoint/2012/main" xmlns:ahyp="http://schemas.microsoft.com/office/drawing/2018/hyperlinkcolor">
-  <p:cSld>
-    <p:spTree>
-      <p:nvGrpSpPr>
-        <p:cNvPr id="347" name="Shape 347"/>
+        <p:cNvPr id="342" name="Shape 342"/>
         <p:cNvGrpSpPr/>
         <p:nvPr/>
       </p:nvGrpSpPr>
@@ -16985,7 +16523,7 @@
       </p:grpSpPr>
       <p:sp>
         <p:nvSpPr>
-          <p:cNvPr id="348" name="Google Shape;348;p23"/>
+          <p:cNvPr id="343" name="Google Shape;343;p22"/>
           <p:cNvSpPr txBox="1"/>
           <p:nvPr>
             <p:ph type="title"/>
@@ -17041,7 +16579,7 @@
       </p:sp>
       <p:sp>
         <p:nvSpPr>
-          <p:cNvPr id="349" name="Google Shape;349;p23"/>
+          <p:cNvPr id="344" name="Google Shape;344;p22"/>
           <p:cNvSpPr txBox="1"/>
           <p:nvPr>
             <p:ph idx="1" type="body"/>
@@ -17116,7 +16654,7 @@
       </p:sp>
       <p:sp>
         <p:nvSpPr>
-          <p:cNvPr id="350" name="Google Shape;350;p23"/>
+          <p:cNvPr id="345" name="Google Shape;345;p22"/>
           <p:cNvSpPr txBox="1"/>
           <p:nvPr>
             <p:ph idx="1" type="body"/>
@@ -17183,7 +16721,7 @@
             </a:pPr>
             <a:r>
               <a:rPr lang="fr"/>
-              <a:t>Implementation of the design</a:t>
+              <a:t>Compare with other students’ metrics</a:t>
             </a:r>
             <a:endParaRPr/>
           </a:p>
@@ -17191,7 +16729,7 @@
       </p:sp>
       <p:sp>
         <p:nvSpPr>
-          <p:cNvPr id="351" name="Google Shape;351;p23"/>
+          <p:cNvPr id="346" name="Google Shape;346;p22"/>
           <p:cNvSpPr txBox="1"/>
           <p:nvPr/>
         </p:nvSpPr>
@@ -17249,7 +16787,7 @@
       </p:sp>
       <p:sp>
         <p:nvSpPr>
-          <p:cNvPr id="352" name="Google Shape;352;p23"/>
+          <p:cNvPr id="347" name="Google Shape;347;p22"/>
           <p:cNvSpPr txBox="1"/>
           <p:nvPr>
             <p:ph type="title"/>
@@ -17303,12 +16841,12 @@
 </p:sld>
 </file>
 
-<file path=ppt/slides/slide12.xml><?xml version="1.0" encoding="utf-8"?>
+<file path=ppt/slides/slide11.xml><?xml version="1.0" encoding="utf-8"?>
 <p:sld xmlns:a="http://schemas.openxmlformats.org/drawingml/2006/main" xmlns:r="http://schemas.openxmlformats.org/officeDocument/2006/relationships" xmlns:mc="http://schemas.openxmlformats.org/markup-compatibility/2006" xmlns:mv="urn:schemas-microsoft-com:mac:vml" xmlns:p="http://schemas.openxmlformats.org/presentationml/2006/main" xmlns:c="http://schemas.openxmlformats.org/drawingml/2006/chart" xmlns:dgm="http://schemas.openxmlformats.org/drawingml/2006/diagram" xmlns:o="urn:schemas-microsoft-com:office:office" xmlns:v="urn:schemas-microsoft-com:vml" xmlns:pvml="urn:schemas-microsoft-com:office:powerpoint" xmlns:com="http://schemas.openxmlformats.org/drawingml/2006/compatibility" xmlns:p14="http://schemas.microsoft.com/office/powerpoint/2010/main" xmlns:p15="http://schemas.microsoft.com/office/powerpoint/2012/main" xmlns:ahyp="http://schemas.microsoft.com/office/drawing/2018/hyperlinkcolor">
   <p:cSld>
     <p:spTree>
       <p:nvGrpSpPr>
-        <p:cNvPr id="356" name="Shape 356"/>
+        <p:cNvPr id="351" name="Shape 351"/>
         <p:cNvGrpSpPr/>
         <p:nvPr/>
       </p:nvGrpSpPr>
@@ -17322,7 +16860,7 @@
       </p:grpSpPr>
       <p:sp>
         <p:nvSpPr>
-          <p:cNvPr id="357" name="Google Shape;357;p24"/>
+          <p:cNvPr id="352" name="Google Shape;352;p23"/>
           <p:cNvSpPr txBox="1"/>
           <p:nvPr>
             <p:ph type="title"/>
@@ -17378,7 +16916,7 @@
       </p:sp>
       <p:sp>
         <p:nvSpPr>
-          <p:cNvPr id="358" name="Google Shape;358;p24"/>
+          <p:cNvPr id="353" name="Google Shape;353;p23"/>
           <p:cNvSpPr txBox="1"/>
           <p:nvPr>
             <p:ph idx="1" type="body"/>
@@ -17445,7 +16983,7 @@
             </a:pPr>
             <a:r>
               <a:rPr lang="fr"/>
-              <a:t>Implement sorting and merging across workers.</a:t>
+              <a:t>Implement presorting and merging across workers.</a:t>
             </a:r>
             <a:endParaRPr/>
           </a:p>
@@ -17462,7 +17000,7 @@
             </a:pPr>
             <a:r>
               <a:rPr lang="fr"/>
-              <a:t>Perform initial sorting/partitioning on worker nodes.</a:t>
+              <a:t>Implement exchange between workers.</a:t>
             </a:r>
             <a:endParaRPr/>
           </a:p>
@@ -17504,7 +17042,7 @@
       </p:sp>
       <p:sp>
         <p:nvSpPr>
-          <p:cNvPr id="359" name="Google Shape;359;p24"/>
+          <p:cNvPr id="354" name="Google Shape;354;p23"/>
           <p:cNvSpPr txBox="1"/>
           <p:nvPr/>
         </p:nvSpPr>
@@ -17568,12 +17106,12 @@
 </p:sld>
 </file>
 
-<file path=ppt/slides/slide13.xml><?xml version="1.0" encoding="utf-8"?>
+<file path=ppt/slides/slide12.xml><?xml version="1.0" encoding="utf-8"?>
 <p:sld xmlns:a="http://schemas.openxmlformats.org/drawingml/2006/main" xmlns:r="http://schemas.openxmlformats.org/officeDocument/2006/relationships" xmlns:mc="http://schemas.openxmlformats.org/markup-compatibility/2006" xmlns:mv="urn:schemas-microsoft-com:mac:vml" xmlns:p="http://schemas.openxmlformats.org/presentationml/2006/main" xmlns:c="http://schemas.openxmlformats.org/drawingml/2006/chart" xmlns:dgm="http://schemas.openxmlformats.org/drawingml/2006/diagram" xmlns:o="urn:schemas-microsoft-com:office:office" xmlns:v="urn:schemas-microsoft-com:vml" xmlns:pvml="urn:schemas-microsoft-com:office:powerpoint" xmlns:com="http://schemas.openxmlformats.org/drawingml/2006/compatibility" xmlns:p14="http://schemas.microsoft.com/office/powerpoint/2010/main" xmlns:p15="http://schemas.microsoft.com/office/powerpoint/2012/main" xmlns:ahyp="http://schemas.microsoft.com/office/drawing/2018/hyperlinkcolor">
   <p:cSld>
     <p:spTree>
       <p:nvGrpSpPr>
-        <p:cNvPr id="363" name="Shape 363"/>
+        <p:cNvPr id="358" name="Shape 358"/>
         <p:cNvGrpSpPr/>
         <p:nvPr/>
       </p:nvGrpSpPr>
@@ -17587,7 +17125,7 @@
       </p:grpSpPr>
       <p:sp>
         <p:nvSpPr>
-          <p:cNvPr id="364" name="Google Shape;364;p25"/>
+          <p:cNvPr id="359" name="Google Shape;359;p24"/>
           <p:cNvSpPr txBox="1"/>
           <p:nvPr>
             <p:ph type="title"/>
@@ -17635,7 +17173,7 @@
       </p:sp>
       <p:sp>
         <p:nvSpPr>
-          <p:cNvPr id="365" name="Google Shape;365;p25"/>
+          <p:cNvPr id="360" name="Google Shape;360;p24"/>
           <p:cNvSpPr txBox="1"/>
           <p:nvPr>
             <p:ph idx="1" type="body"/>
@@ -17685,7 +17223,7 @@
             </a:pPr>
             <a:r>
               <a:rPr lang="fr"/>
-              <a:t>After a run, Worker 1 should have the first 50GB of data, Worker 2 the next 50GB and so on.</a:t>
+              <a:t>Once the execution finished, Worker 1 should have the first batch of sorted data, Worker 2 the next batch and so on. Every batch size should be around 50GB</a:t>
             </a:r>
             <a:endParaRPr/>
           </a:p>
@@ -17766,12 +17304,12 @@
 </p:sld>
 </file>
 
-<file path=ppt/slides/slide14.xml><?xml version="1.0" encoding="utf-8"?>
+<file path=ppt/slides/slide13.xml><?xml version="1.0" encoding="utf-8"?>
 <p:sld xmlns:a="http://schemas.openxmlformats.org/drawingml/2006/main" xmlns:r="http://schemas.openxmlformats.org/officeDocument/2006/relationships" xmlns:mc="http://schemas.openxmlformats.org/markup-compatibility/2006" xmlns:mv="urn:schemas-microsoft-com:mac:vml" xmlns:p="http://schemas.openxmlformats.org/presentationml/2006/main" xmlns:c="http://schemas.openxmlformats.org/drawingml/2006/chart" xmlns:dgm="http://schemas.openxmlformats.org/drawingml/2006/diagram" xmlns:o="urn:schemas-microsoft-com:office:office" xmlns:v="urn:schemas-microsoft-com:vml" xmlns:pvml="urn:schemas-microsoft-com:office:powerpoint" xmlns:com="http://schemas.openxmlformats.org/drawingml/2006/compatibility" xmlns:p14="http://schemas.microsoft.com/office/powerpoint/2010/main" xmlns:p15="http://schemas.microsoft.com/office/powerpoint/2012/main" xmlns:ahyp="http://schemas.microsoft.com/office/drawing/2018/hyperlinkcolor">
   <p:cSld>
     <p:spTree>
       <p:nvGrpSpPr>
-        <p:cNvPr id="369" name="Shape 369"/>
+        <p:cNvPr id="364" name="Shape 364"/>
         <p:cNvGrpSpPr/>
         <p:nvPr/>
       </p:nvGrpSpPr>
@@ -17785,7 +17323,7 @@
       </p:grpSpPr>
       <p:sp>
         <p:nvSpPr>
-          <p:cNvPr id="370" name="Google Shape;370;p26"/>
+          <p:cNvPr id="365" name="Google Shape;365;p25"/>
           <p:cNvSpPr txBox="1"/>
           <p:nvPr>
             <p:ph type="title"/>
@@ -17833,7 +17371,7 @@
       </p:sp>
       <p:sp>
         <p:nvSpPr>
-          <p:cNvPr id="371" name="Google Shape;371;p26"/>
+          <p:cNvPr id="366" name="Google Shape;366;p25"/>
           <p:cNvSpPr txBox="1"/>
           <p:nvPr>
             <p:ph idx="1" type="body"/>
@@ -17952,7 +17490,7 @@
         </p:nvSpPr>
         <p:spPr>
           <a:xfrm>
-            <a:off x="1303800" y="598575"/>
+            <a:off x="1261050" y="1765400"/>
             <a:ext cx="7030500" cy="999300"/>
           </a:xfrm>
           <a:prstGeom prst="rect">
@@ -18000,8 +17538,8 @@
         </p:nvSpPr>
         <p:spPr>
           <a:xfrm>
-            <a:off x="1218175" y="1597875"/>
-            <a:ext cx="7116000" cy="2892000"/>
+            <a:off x="1261050" y="2764700"/>
+            <a:ext cx="7116000" cy="1700100"/>
           </a:xfrm>
           <a:prstGeom prst="rect">
             <a:avLst/>
@@ -18066,6 +17604,64 @@
               <a:t>Overview of sorting large binary records in distributed systems</a:t>
             </a:r>
             <a:endParaRPr sz="1400"/>
+          </a:p>
+        </p:txBody>
+      </p:sp>
+      <p:sp>
+        <p:nvSpPr>
+          <p:cNvPr id="286" name="Google Shape;286;p14"/>
+          <p:cNvSpPr txBox="1"/>
+          <p:nvPr/>
+        </p:nvSpPr>
+        <p:spPr>
+          <a:xfrm>
+            <a:off x="1261050" y="928700"/>
+            <a:ext cx="5834100" cy="630900"/>
+          </a:xfrm>
+          <a:prstGeom prst="rect">
+            <a:avLst/>
+          </a:prstGeom>
+          <a:noFill/>
+          <a:ln>
+            <a:noFill/>
+          </a:ln>
+        </p:spPr>
+        <p:txBody>
+          <a:bodyPr anchorCtr="0" anchor="t" bIns="91425" lIns="91425" spcFirstLastPara="1" rIns="91425" wrap="square" tIns="91425">
+            <a:noAutofit/>
+          </a:bodyPr>
+          <a:lstStyle/>
+          <a:p>
+            <a:pPr indent="0" lvl="0" marL="0" rtl="0" algn="l">
+              <a:spcBef>
+                <a:spcPts val="0"/>
+              </a:spcBef>
+              <a:spcAft>
+                <a:spcPts val="0"/>
+              </a:spcAft>
+              <a:buNone/>
+            </a:pPr>
+            <a:r>
+              <a:rPr lang="fr" sz="2800">
+                <a:solidFill>
+                  <a:srgbClr val="FF0000"/>
+                </a:solidFill>
+                <a:latin typeface="Lexend ExtraBold"/>
+                <a:ea typeface="Lexend ExtraBold"/>
+                <a:cs typeface="Lexend ExtraBold"/>
+                <a:sym typeface="Lexend ExtraBold"/>
+              </a:rPr>
+              <a:t>Project Overview</a:t>
+            </a:r>
+            <a:endParaRPr sz="2800">
+              <a:solidFill>
+                <a:srgbClr val="FF0000"/>
+              </a:solidFill>
+              <a:latin typeface="Lexend ExtraBold"/>
+              <a:ea typeface="Lexend ExtraBold"/>
+              <a:cs typeface="Lexend ExtraBold"/>
+              <a:sym typeface="Lexend ExtraBold"/>
+            </a:endParaRPr>
           </a:p>
         </p:txBody>
       </p:sp>
@@ -18082,7 +17678,7 @@
   <p:cSld>
     <p:spTree>
       <p:nvGrpSpPr>
-        <p:cNvPr id="289" name="Shape 289"/>
+        <p:cNvPr id="290" name="Shape 290"/>
         <p:cNvGrpSpPr/>
         <p:nvPr/>
       </p:nvGrpSpPr>
@@ -18096,7 +17692,7 @@
       </p:grpSpPr>
       <p:sp>
         <p:nvSpPr>
-          <p:cNvPr id="290" name="Google Shape;290;p15"/>
+          <p:cNvPr id="291" name="Google Shape;291;p15"/>
           <p:cNvSpPr txBox="1"/>
           <p:nvPr>
             <p:ph type="title"/>
@@ -18144,7 +17740,7 @@
       </p:sp>
       <p:sp>
         <p:nvSpPr>
-          <p:cNvPr id="291" name="Google Shape;291;p15"/>
+          <p:cNvPr id="292" name="Google Shape;292;p15"/>
           <p:cNvSpPr txBox="1"/>
           <p:nvPr>
             <p:ph idx="1" type="body"/>
@@ -18291,7 +17887,7 @@
   <p:cSld>
     <p:spTree>
       <p:nvGrpSpPr>
-        <p:cNvPr id="295" name="Shape 295"/>
+        <p:cNvPr id="296" name="Shape 296"/>
         <p:cNvGrpSpPr/>
         <p:nvPr/>
       </p:nvGrpSpPr>
@@ -18305,7 +17901,7 @@
       </p:grpSpPr>
       <p:sp>
         <p:nvSpPr>
-          <p:cNvPr id="296" name="Google Shape;296;p16"/>
+          <p:cNvPr id="297" name="Google Shape;297;p16"/>
           <p:cNvSpPr txBox="1"/>
           <p:nvPr>
             <p:ph type="title"/>
@@ -18353,7 +17949,7 @@
       </p:sp>
       <p:sp>
         <p:nvSpPr>
-          <p:cNvPr id="297" name="Google Shape;297;p16"/>
+          <p:cNvPr id="298" name="Google Shape;298;p16"/>
           <p:cNvSpPr txBox="1"/>
           <p:nvPr>
             <p:ph idx="1" type="body"/>
@@ -18402,7 +17998,7 @@
             </a:pPr>
             <a:r>
               <a:rPr lang="fr"/>
-              <a:t>memory, </a:t>
+              <a:t>Memory, </a:t>
             </a:r>
             <a:endParaRPr/>
           </a:p>
@@ -18419,7 +18015,7 @@
             </a:pPr>
             <a:r>
               <a:rPr lang="fr"/>
-              <a:t>disk space, </a:t>
+              <a:t>Disk space, </a:t>
             </a:r>
             <a:endParaRPr/>
           </a:p>
@@ -18436,7 +18032,7 @@
             </a:pPr>
             <a:r>
               <a:rPr lang="fr"/>
-              <a:t>large data size and external sorting, </a:t>
+              <a:t>Large data size and external sorting, </a:t>
             </a:r>
             <a:endParaRPr/>
           </a:p>
@@ -18453,7 +18049,7 @@
             </a:pPr>
             <a:r>
               <a:rPr lang="fr"/>
-              <a:t>coordination of the workers. </a:t>
+              <a:t>Coordination of the workers. </a:t>
             </a:r>
             <a:endParaRPr/>
           </a:p>
@@ -18539,7 +18135,7 @@
   <p:cSld>
     <p:spTree>
       <p:nvGrpSpPr>
-        <p:cNvPr id="301" name="Shape 301"/>
+        <p:cNvPr id="302" name="Shape 302"/>
         <p:cNvGrpSpPr/>
         <p:nvPr/>
       </p:nvGrpSpPr>
@@ -18553,7 +18149,7 @@
       </p:grpSpPr>
       <p:sp>
         <p:nvSpPr>
-          <p:cNvPr id="302" name="Google Shape;302;p17"/>
+          <p:cNvPr id="303" name="Google Shape;303;p17"/>
           <p:cNvSpPr txBox="1"/>
           <p:nvPr>
             <p:ph type="title"/>
@@ -18601,7 +18197,7 @@
       </p:sp>
       <p:sp>
         <p:nvSpPr>
-          <p:cNvPr id="303" name="Google Shape;303;p17"/>
+          <p:cNvPr id="304" name="Google Shape;304;p17"/>
           <p:cNvSpPr txBox="1"/>
           <p:nvPr>
             <p:ph idx="1" type="body"/>
@@ -18667,7 +18263,7 @@
             </a:pPr>
             <a:r>
               <a:rPr lang="fr"/>
-              <a:t>first kick: milestones</a:t>
+              <a:t>First kick : milestones</a:t>
             </a:r>
             <a:endParaRPr/>
           </a:p>
@@ -18716,7 +18312,7 @@
       </p:sp>
       <p:pic>
         <p:nvPicPr>
-          <p:cNvPr id="304" name="Google Shape;304;p17"/>
+          <p:cNvPr id="305" name="Google Shape;305;p17"/>
           <p:cNvPicPr preferRelativeResize="0"/>
           <p:nvPr/>
         </p:nvPicPr>
@@ -18755,7 +18351,136 @@
   <p:cSld>
     <p:spTree>
       <p:nvGrpSpPr>
-        <p:cNvPr id="308" name="Shape 308"/>
+        <p:cNvPr id="309" name="Shape 309"/>
+        <p:cNvGrpSpPr/>
+        <p:nvPr/>
+      </p:nvGrpSpPr>
+      <p:grpSpPr>
+        <a:xfrm>
+          <a:off x="0" y="0"/>
+          <a:ext cx="0" cy="0"/>
+          <a:chOff x="0" y="0"/>
+          <a:chExt cx="0" cy="0"/>
+        </a:xfrm>
+      </p:grpSpPr>
+      <p:pic>
+        <p:nvPicPr>
+          <p:cNvPr id="310" name="Google Shape;310;p18"/>
+          <p:cNvPicPr preferRelativeResize="0"/>
+          <p:nvPr/>
+        </p:nvPicPr>
+        <p:blipFill>
+          <a:blip r:embed="rId3">
+            <a:alphaModFix/>
+          </a:blip>
+          <a:stretch>
+            <a:fillRect/>
+          </a:stretch>
+        </p:blipFill>
+        <p:spPr>
+          <a:xfrm>
+            <a:off x="108000" y="1535430"/>
+            <a:ext cx="4723825" cy="2834747"/>
+          </a:xfrm>
+          <a:prstGeom prst="rect">
+            <a:avLst/>
+          </a:prstGeom>
+          <a:noFill/>
+          <a:ln>
+            <a:noFill/>
+          </a:ln>
+        </p:spPr>
+      </p:pic>
+      <p:sp>
+        <p:nvSpPr>
+          <p:cNvPr id="311" name="Google Shape;311;p18"/>
+          <p:cNvSpPr txBox="1"/>
+          <p:nvPr>
+            <p:ph type="title"/>
+          </p:nvPr>
+        </p:nvSpPr>
+        <p:spPr>
+          <a:xfrm>
+            <a:off x="1303800" y="598575"/>
+            <a:ext cx="7030500" cy="999300"/>
+          </a:xfrm>
+          <a:prstGeom prst="rect">
+            <a:avLst/>
+          </a:prstGeom>
+        </p:spPr>
+        <p:txBody>
+          <a:bodyPr anchorCtr="0" anchor="t" bIns="91425" lIns="91425" spcFirstLastPara="1" rIns="91425" wrap="square" tIns="91425">
+            <a:normAutofit/>
+          </a:bodyPr>
+          <a:lstStyle/>
+          <a:p>
+            <a:pPr indent="0" lvl="0" marL="0" rtl="0" algn="l">
+              <a:spcBef>
+                <a:spcPts val="0"/>
+              </a:spcBef>
+              <a:spcAft>
+                <a:spcPts val="0"/>
+              </a:spcAft>
+              <a:buNone/>
+            </a:pPr>
+            <a:r>
+              <a:rPr lang="fr" sz="2600">
+                <a:solidFill>
+                  <a:srgbClr val="0000FF"/>
+                </a:solidFill>
+              </a:rPr>
+              <a:t>Milestones and Timeline</a:t>
+            </a:r>
+            <a:endParaRPr sz="2600">
+              <a:solidFill>
+                <a:srgbClr val="0000FF"/>
+              </a:solidFill>
+            </a:endParaRPr>
+          </a:p>
+        </p:txBody>
+      </p:sp>
+      <p:pic>
+        <p:nvPicPr>
+          <p:cNvPr id="312" name="Google Shape;312;p18"/>
+          <p:cNvPicPr preferRelativeResize="0"/>
+          <p:nvPr/>
+        </p:nvPicPr>
+        <p:blipFill>
+          <a:blip r:embed="rId4">
+            <a:alphaModFix/>
+          </a:blip>
+          <a:stretch>
+            <a:fillRect/>
+          </a:stretch>
+        </p:blipFill>
+        <p:spPr>
+          <a:xfrm>
+            <a:off x="4955450" y="1297800"/>
+            <a:ext cx="3107525" cy="3452801"/>
+          </a:xfrm>
+          <a:prstGeom prst="rect">
+            <a:avLst/>
+          </a:prstGeom>
+          <a:noFill/>
+          <a:ln>
+            <a:noFill/>
+          </a:ln>
+        </p:spPr>
+      </p:pic>
+    </p:spTree>
+  </p:cSld>
+  <p:clrMapOvr>
+    <a:masterClrMapping/>
+  </p:clrMapOvr>
+</p:sld>
+</file>
+
+<file path=ppt/slides/slide7.xml><?xml version="1.0" encoding="utf-8"?>
+<p:sld xmlns:a="http://schemas.openxmlformats.org/drawingml/2006/main" xmlns:r="http://schemas.openxmlformats.org/officeDocument/2006/relationships" xmlns:mc="http://schemas.openxmlformats.org/markup-compatibility/2006" xmlns:mv="urn:schemas-microsoft-com:mac:vml" xmlns:p="http://schemas.openxmlformats.org/presentationml/2006/main" xmlns:c="http://schemas.openxmlformats.org/drawingml/2006/chart" xmlns:dgm="http://schemas.openxmlformats.org/drawingml/2006/diagram" xmlns:o="urn:schemas-microsoft-com:office:office" xmlns:v="urn:schemas-microsoft-com:vml" xmlns:pvml="urn:schemas-microsoft-com:office:powerpoint" xmlns:com="http://schemas.openxmlformats.org/drawingml/2006/compatibility" xmlns:p14="http://schemas.microsoft.com/office/powerpoint/2010/main" xmlns:p15="http://schemas.microsoft.com/office/powerpoint/2012/main" xmlns:ahyp="http://schemas.microsoft.com/office/drawing/2018/hyperlinkcolor">
+  <p:cSld>
+    <p:spTree>
+      <p:nvGrpSpPr>
+        <p:cNvPr id="316" name="Shape 316"/>
         <p:cNvGrpSpPr/>
         <p:nvPr/>
       </p:nvGrpSpPr>
@@ -18769,7 +18494,7 @@
       </p:grpSpPr>
       <p:sp>
         <p:nvSpPr>
-          <p:cNvPr id="309" name="Google Shape;309;p18"/>
+          <p:cNvPr id="317" name="Google Shape;317;p19"/>
           <p:cNvSpPr txBox="1"/>
           <p:nvPr>
             <p:ph type="title"/>
@@ -18825,7 +18550,7 @@
       </p:sp>
       <p:sp>
         <p:nvSpPr>
-          <p:cNvPr id="310" name="Google Shape;310;p18"/>
+          <p:cNvPr id="318" name="Google Shape;318;p19"/>
           <p:cNvSpPr txBox="1"/>
           <p:nvPr>
             <p:ph idx="1" type="body"/>
@@ -18905,7 +18630,7 @@
       </p:sp>
       <p:sp>
         <p:nvSpPr>
-          <p:cNvPr id="311" name="Google Shape;311;p18"/>
+          <p:cNvPr id="319" name="Google Shape;319;p19"/>
           <p:cNvSpPr txBox="1"/>
           <p:nvPr/>
         </p:nvSpPr>
@@ -18954,7 +18679,7 @@
       </p:sp>
       <p:sp>
         <p:nvSpPr>
-          <p:cNvPr id="312" name="Google Shape;312;p18"/>
+          <p:cNvPr id="320" name="Google Shape;320;p19"/>
           <p:cNvSpPr txBox="1"/>
           <p:nvPr/>
         </p:nvSpPr>
@@ -19012,7 +18737,7 @@
       </p:sp>
       <p:pic>
         <p:nvPicPr>
-          <p:cNvPr id="313" name="Google Shape;313;p18"/>
+          <p:cNvPr id="321" name="Google Shape;321;p19"/>
           <p:cNvPicPr preferRelativeResize="0"/>
           <p:nvPr/>
         </p:nvPicPr>
@@ -19046,12 +18771,12 @@
 </p:sld>
 </file>
 
-<file path=ppt/slides/slide7.xml><?xml version="1.0" encoding="utf-8"?>
+<file path=ppt/slides/slide8.xml><?xml version="1.0" encoding="utf-8"?>
 <p:sld xmlns:a="http://schemas.openxmlformats.org/drawingml/2006/main" xmlns:r="http://schemas.openxmlformats.org/officeDocument/2006/relationships" xmlns:mc="http://schemas.openxmlformats.org/markup-compatibility/2006" xmlns:mv="urn:schemas-microsoft-com:mac:vml" xmlns:p="http://schemas.openxmlformats.org/presentationml/2006/main" xmlns:c="http://schemas.openxmlformats.org/drawingml/2006/chart" xmlns:dgm="http://schemas.openxmlformats.org/drawingml/2006/diagram" xmlns:o="urn:schemas-microsoft-com:office:office" xmlns:v="urn:schemas-microsoft-com:vml" xmlns:pvml="urn:schemas-microsoft-com:office:powerpoint" xmlns:com="http://schemas.openxmlformats.org/drawingml/2006/compatibility" xmlns:p14="http://schemas.microsoft.com/office/powerpoint/2010/main" xmlns:p15="http://schemas.microsoft.com/office/powerpoint/2012/main" xmlns:ahyp="http://schemas.microsoft.com/office/drawing/2018/hyperlinkcolor">
   <p:cSld>
     <p:spTree>
       <p:nvGrpSpPr>
-        <p:cNvPr id="317" name="Shape 317"/>
+        <p:cNvPr id="325" name="Shape 325"/>
         <p:cNvGrpSpPr/>
         <p:nvPr/>
       </p:nvGrpSpPr>
@@ -19063,37 +18788,9 @@
           <a:chExt cx="0" cy="0"/>
         </a:xfrm>
       </p:grpSpPr>
-      <p:pic>
-        <p:nvPicPr>
-          <p:cNvPr id="318" name="Google Shape;318;p19"/>
-          <p:cNvPicPr preferRelativeResize="0"/>
-          <p:nvPr/>
-        </p:nvPicPr>
-        <p:blipFill>
-          <a:blip r:embed="rId3">
-            <a:alphaModFix/>
-          </a:blip>
-          <a:stretch>
-            <a:fillRect/>
-          </a:stretch>
-        </p:blipFill>
-        <p:spPr>
-          <a:xfrm>
-            <a:off x="2154850" y="1597875"/>
-            <a:ext cx="5328399" cy="3197551"/>
-          </a:xfrm>
-          <a:prstGeom prst="rect">
-            <a:avLst/>
-          </a:prstGeom>
-          <a:noFill/>
-          <a:ln>
-            <a:noFill/>
-          </a:ln>
-        </p:spPr>
-      </p:pic>
       <p:sp>
         <p:nvSpPr>
-          <p:cNvPr id="319" name="Google Shape;319;p19"/>
+          <p:cNvPr id="326" name="Google Shape;326;p20"/>
           <p:cNvSpPr txBox="1"/>
           <p:nvPr>
             <p:ph type="title"/>
@@ -19129,1037 +18826,6 @@
                   <a:srgbClr val="0000FF"/>
                 </a:solidFill>
               </a:rPr>
-              <a:t>Milestones and Timeline</a:t>
-            </a:r>
-            <a:endParaRPr sz="2600">
-              <a:solidFill>
-                <a:srgbClr val="0000FF"/>
-              </a:solidFill>
-            </a:endParaRPr>
-          </a:p>
-        </p:txBody>
-      </p:sp>
-    </p:spTree>
-  </p:cSld>
-  <p:clrMapOvr>
-    <a:masterClrMapping/>
-  </p:clrMapOvr>
-</p:sld>
-</file>
-
-<file path=ppt/slides/slide8.xml><?xml version="1.0" encoding="utf-8"?>
-<p:sld xmlns:a="http://schemas.openxmlformats.org/drawingml/2006/main" xmlns:r="http://schemas.openxmlformats.org/officeDocument/2006/relationships" xmlns:mc="http://schemas.openxmlformats.org/markup-compatibility/2006" xmlns:mv="urn:schemas-microsoft-com:mac:vml" xmlns:p="http://schemas.openxmlformats.org/presentationml/2006/main" xmlns:c="http://schemas.openxmlformats.org/drawingml/2006/chart" xmlns:dgm="http://schemas.openxmlformats.org/drawingml/2006/diagram" xmlns:o="urn:schemas-microsoft-com:office:office" xmlns:v="urn:schemas-microsoft-com:vml" xmlns:pvml="urn:schemas-microsoft-com:office:powerpoint" xmlns:com="http://schemas.openxmlformats.org/drawingml/2006/compatibility" xmlns:p14="http://schemas.microsoft.com/office/powerpoint/2010/main" xmlns:p15="http://schemas.microsoft.com/office/powerpoint/2012/main" xmlns:ahyp="http://schemas.microsoft.com/office/drawing/2018/hyperlinkcolor">
-  <p:cSld>
-    <p:spTree>
-      <p:nvGrpSpPr>
-        <p:cNvPr id="323" name="Shape 323"/>
-        <p:cNvGrpSpPr/>
-        <p:nvPr/>
-      </p:nvGrpSpPr>
-      <p:grpSpPr>
-        <a:xfrm>
-          <a:off x="0" y="0"/>
-          <a:ext cx="0" cy="0"/>
-          <a:chOff x="0" y="0"/>
-          <a:chExt cx="0" cy="0"/>
-        </a:xfrm>
-      </p:grpSpPr>
-      <p:sp>
-        <p:nvSpPr>
-          <p:cNvPr id="324" name="Google Shape;324;p20"/>
-          <p:cNvSpPr txBox="1"/>
-          <p:nvPr>
-            <p:ph type="title"/>
-          </p:nvPr>
-        </p:nvSpPr>
-        <p:spPr>
-          <a:xfrm>
-            <a:off x="1303800" y="598575"/>
-            <a:ext cx="7030500" cy="999300"/>
-          </a:xfrm>
-          <a:prstGeom prst="rect">
-            <a:avLst/>
-          </a:prstGeom>
-        </p:spPr>
-        <p:txBody>
-          <a:bodyPr anchorCtr="0" anchor="t" bIns="91425" lIns="91425" spcFirstLastPara="1" rIns="91425" wrap="square" tIns="91425">
-            <a:normAutofit/>
-          </a:bodyPr>
-          <a:lstStyle/>
-          <a:p>
-            <a:pPr indent="0" lvl="0" marL="0" rtl="0" algn="l">
-              <a:spcBef>
-                <a:spcPts val="0"/>
-              </a:spcBef>
-              <a:spcAft>
-                <a:spcPts val="0"/>
-              </a:spcAft>
-              <a:buNone/>
-            </a:pPr>
-            <a:r>
-              <a:rPr lang="fr"/>
-              <a:t>Project Milestones Timeline</a:t>
-            </a:r>
-            <a:endParaRPr/>
-          </a:p>
-        </p:txBody>
-      </p:sp>
-      <p:sp>
-        <p:nvSpPr>
-          <p:cNvPr id="325" name="Google Shape;325;p20"/>
-          <p:cNvSpPr txBox="1"/>
-          <p:nvPr>
-            <p:ph idx="1" type="body"/>
-          </p:nvPr>
-        </p:nvSpPr>
-        <p:spPr>
-          <a:xfrm>
-            <a:off x="359950" y="1597875"/>
-            <a:ext cx="4169700" cy="2920500"/>
-          </a:xfrm>
-          <a:prstGeom prst="rect">
-            <a:avLst/>
-          </a:prstGeom>
-        </p:spPr>
-        <p:txBody>
-          <a:bodyPr anchorCtr="0" anchor="t" bIns="91425" lIns="91425" spcFirstLastPara="1" rIns="91425" wrap="square" tIns="91425">
-            <a:normAutofit fontScale="92500" lnSpcReduction="20000"/>
-          </a:bodyPr>
-          <a:lstStyle/>
-          <a:p>
-            <a:pPr indent="0" lvl="0" marL="0" rtl="0" algn="l">
-              <a:spcBef>
-                <a:spcPts val="1200"/>
-              </a:spcBef>
-              <a:spcAft>
-                <a:spcPts val="0"/>
-              </a:spcAft>
-              <a:buNone/>
-            </a:pPr>
-            <a:r>
-              <a:rPr b="1" lang="fr" sz="1100">
-                <a:solidFill>
-                  <a:srgbClr val="000000"/>
-                </a:solidFill>
-                <a:latin typeface="Arial"/>
-                <a:ea typeface="Arial"/>
-                <a:cs typeface="Arial"/>
-                <a:sym typeface="Arial"/>
-              </a:rPr>
-              <a:t>Milestone #1 (Weeks 1-2):</a:t>
-            </a:r>
-            <a:endParaRPr b="1" sz="1100">
-              <a:solidFill>
-                <a:srgbClr val="000000"/>
-              </a:solidFill>
-              <a:latin typeface="Arial"/>
-              <a:ea typeface="Arial"/>
-              <a:cs typeface="Arial"/>
-              <a:sym typeface="Arial"/>
-            </a:endParaRPr>
-          </a:p>
-          <a:p>
-            <a:pPr indent="-293211" lvl="0" marL="457200" rtl="0" algn="l">
-              <a:spcBef>
-                <a:spcPts val="1200"/>
-              </a:spcBef>
-              <a:spcAft>
-                <a:spcPts val="0"/>
-              </a:spcAft>
-              <a:buClr>
-                <a:srgbClr val="000000"/>
-              </a:buClr>
-              <a:buSzPct val="100000"/>
-              <a:buFont typeface="Arial"/>
-              <a:buChar char="●"/>
-            </a:pPr>
-            <a:r>
-              <a:rPr lang="fr" sz="1100">
-                <a:solidFill>
-                  <a:srgbClr val="000000"/>
-                </a:solidFill>
-                <a:latin typeface="Arial"/>
-                <a:ea typeface="Arial"/>
-                <a:cs typeface="Arial"/>
-                <a:sym typeface="Arial"/>
-              </a:rPr>
-              <a:t>Generate input data using </a:t>
-            </a:r>
-            <a:r>
-              <a:rPr b="1" lang="fr" sz="1100">
-                <a:solidFill>
-                  <a:srgbClr val="000000"/>
-                </a:solidFill>
-                <a:latin typeface="Arial"/>
-                <a:ea typeface="Arial"/>
-                <a:cs typeface="Arial"/>
-                <a:sym typeface="Arial"/>
-              </a:rPr>
-              <a:t>gensort</a:t>
-            </a:r>
-            <a:r>
-              <a:rPr lang="fr" sz="1100">
-                <a:solidFill>
-                  <a:srgbClr val="000000"/>
-                </a:solidFill>
-                <a:latin typeface="Arial"/>
-                <a:ea typeface="Arial"/>
-                <a:cs typeface="Arial"/>
-                <a:sym typeface="Arial"/>
-              </a:rPr>
-              <a:t>.</a:t>
-            </a:r>
-            <a:endParaRPr sz="1100">
-              <a:solidFill>
-                <a:srgbClr val="000000"/>
-              </a:solidFill>
-              <a:latin typeface="Arial"/>
-              <a:ea typeface="Arial"/>
-              <a:cs typeface="Arial"/>
-              <a:sym typeface="Arial"/>
-            </a:endParaRPr>
-          </a:p>
-          <a:p>
-            <a:pPr indent="-293211" lvl="0" marL="457200" rtl="0" algn="l">
-              <a:spcBef>
-                <a:spcPts val="0"/>
-              </a:spcBef>
-              <a:spcAft>
-                <a:spcPts val="0"/>
-              </a:spcAft>
-              <a:buClr>
-                <a:srgbClr val="000000"/>
-              </a:buClr>
-              <a:buSzPct val="100000"/>
-              <a:buFont typeface="Arial"/>
-              <a:buChar char="●"/>
-            </a:pPr>
-            <a:r>
-              <a:rPr lang="fr" sz="1100">
-                <a:solidFill>
-                  <a:srgbClr val="000000"/>
-                </a:solidFill>
-                <a:latin typeface="Arial"/>
-                <a:ea typeface="Arial"/>
-                <a:cs typeface="Arial"/>
-                <a:sym typeface="Arial"/>
-              </a:rPr>
-              <a:t>Set up the </a:t>
-            </a:r>
-            <a:r>
-              <a:rPr b="1" lang="fr" sz="1100">
-                <a:solidFill>
-                  <a:srgbClr val="000000"/>
-                </a:solidFill>
-                <a:latin typeface="Arial"/>
-                <a:ea typeface="Arial"/>
-                <a:cs typeface="Arial"/>
-                <a:sym typeface="Arial"/>
-              </a:rPr>
-              <a:t>master node</a:t>
-            </a:r>
-            <a:r>
-              <a:rPr lang="fr" sz="1100">
-                <a:solidFill>
-                  <a:srgbClr val="000000"/>
-                </a:solidFill>
-                <a:latin typeface="Arial"/>
-                <a:ea typeface="Arial"/>
-                <a:cs typeface="Arial"/>
-                <a:sym typeface="Arial"/>
-              </a:rPr>
-              <a:t>.</a:t>
-            </a:r>
-            <a:endParaRPr sz="1100">
-              <a:solidFill>
-                <a:srgbClr val="000000"/>
-              </a:solidFill>
-              <a:latin typeface="Arial"/>
-              <a:ea typeface="Arial"/>
-              <a:cs typeface="Arial"/>
-              <a:sym typeface="Arial"/>
-            </a:endParaRPr>
-          </a:p>
-          <a:p>
-            <a:pPr indent="0" lvl="0" marL="0" rtl="0" algn="l">
-              <a:spcBef>
-                <a:spcPts val="1200"/>
-              </a:spcBef>
-              <a:spcAft>
-                <a:spcPts val="0"/>
-              </a:spcAft>
-              <a:buNone/>
-            </a:pPr>
-            <a:r>
-              <a:rPr b="1" lang="fr" sz="1100">
-                <a:solidFill>
-                  <a:srgbClr val="000000"/>
-                </a:solidFill>
-                <a:latin typeface="Arial"/>
-                <a:ea typeface="Arial"/>
-                <a:cs typeface="Arial"/>
-                <a:sym typeface="Arial"/>
-              </a:rPr>
-              <a:t>Milestone #2 (Weeks 3-5):</a:t>
-            </a:r>
-            <a:endParaRPr b="1" sz="1100">
-              <a:solidFill>
-                <a:srgbClr val="000000"/>
-              </a:solidFill>
-              <a:latin typeface="Arial"/>
-              <a:ea typeface="Arial"/>
-              <a:cs typeface="Arial"/>
-              <a:sym typeface="Arial"/>
-            </a:endParaRPr>
-          </a:p>
-          <a:p>
-            <a:pPr indent="-293211" lvl="0" marL="457200" rtl="0" algn="l">
-              <a:spcBef>
-                <a:spcPts val="1200"/>
-              </a:spcBef>
-              <a:spcAft>
-                <a:spcPts val="0"/>
-              </a:spcAft>
-              <a:buClr>
-                <a:srgbClr val="000000"/>
-              </a:buClr>
-              <a:buSzPct val="100000"/>
-              <a:buFont typeface="Arial"/>
-              <a:buChar char="●"/>
-            </a:pPr>
-            <a:r>
-              <a:rPr b="1" lang="fr" sz="1100">
-                <a:solidFill>
-                  <a:srgbClr val="000000"/>
-                </a:solidFill>
-                <a:latin typeface="Arial"/>
-                <a:ea typeface="Arial"/>
-                <a:cs typeface="Arial"/>
-                <a:sym typeface="Arial"/>
-              </a:rPr>
-              <a:t>Week 3:</a:t>
-            </a:r>
-            <a:endParaRPr b="1" sz="1100">
-              <a:solidFill>
-                <a:srgbClr val="000000"/>
-              </a:solidFill>
-              <a:latin typeface="Arial"/>
-              <a:ea typeface="Arial"/>
-              <a:cs typeface="Arial"/>
-              <a:sym typeface="Arial"/>
-            </a:endParaRPr>
-          </a:p>
-          <a:p>
-            <a:pPr indent="-293211" lvl="1" marL="914400" rtl="0" algn="l">
-              <a:spcBef>
-                <a:spcPts val="0"/>
-              </a:spcBef>
-              <a:spcAft>
-                <a:spcPts val="0"/>
-              </a:spcAft>
-              <a:buClr>
-                <a:srgbClr val="000000"/>
-              </a:buClr>
-              <a:buSzPct val="100000"/>
-              <a:buFont typeface="Arial"/>
-              <a:buChar char="○"/>
-            </a:pPr>
-            <a:r>
-              <a:rPr lang="fr">
-                <a:solidFill>
-                  <a:srgbClr val="000000"/>
-                </a:solidFill>
-                <a:latin typeface="Arial"/>
-                <a:ea typeface="Arial"/>
-                <a:cs typeface="Arial"/>
-                <a:sym typeface="Arial"/>
-              </a:rPr>
-              <a:t>Ensure workers connect to master.</a:t>
-            </a:r>
-            <a:endParaRPr>
-              <a:solidFill>
-                <a:srgbClr val="000000"/>
-              </a:solidFill>
-              <a:latin typeface="Arial"/>
-              <a:ea typeface="Arial"/>
-              <a:cs typeface="Arial"/>
-              <a:sym typeface="Arial"/>
-            </a:endParaRPr>
-          </a:p>
-          <a:p>
-            <a:pPr indent="-293211" lvl="1" marL="914400" rtl="0" algn="l">
-              <a:spcBef>
-                <a:spcPts val="0"/>
-              </a:spcBef>
-              <a:spcAft>
-                <a:spcPts val="0"/>
-              </a:spcAft>
-              <a:buClr>
-                <a:srgbClr val="000000"/>
-              </a:buClr>
-              <a:buSzPct val="100000"/>
-              <a:buFont typeface="Arial"/>
-              <a:buChar char="○"/>
-            </a:pPr>
-            <a:r>
-              <a:rPr lang="fr">
-                <a:solidFill>
-                  <a:srgbClr val="000000"/>
-                </a:solidFill>
-                <a:latin typeface="Arial"/>
-                <a:ea typeface="Arial"/>
-                <a:cs typeface="Arial"/>
-                <a:sym typeface="Arial"/>
-              </a:rPr>
-              <a:t>Learn/implement </a:t>
-            </a:r>
-            <a:r>
-              <a:rPr b="1" lang="fr">
-                <a:solidFill>
-                  <a:srgbClr val="000000"/>
-                </a:solidFill>
-                <a:latin typeface="Arial"/>
-                <a:ea typeface="Arial"/>
-                <a:cs typeface="Arial"/>
-                <a:sym typeface="Arial"/>
-              </a:rPr>
-              <a:t>network library</a:t>
-            </a:r>
-            <a:r>
-              <a:rPr lang="fr">
-                <a:solidFill>
-                  <a:srgbClr val="000000"/>
-                </a:solidFill>
-                <a:latin typeface="Arial"/>
-                <a:ea typeface="Arial"/>
-                <a:cs typeface="Arial"/>
-                <a:sym typeface="Arial"/>
-              </a:rPr>
-              <a:t> (e.g., gRPC with Protobuf).</a:t>
-            </a:r>
-            <a:endParaRPr>
-              <a:solidFill>
-                <a:srgbClr val="000000"/>
-              </a:solidFill>
-              <a:latin typeface="Arial"/>
-              <a:ea typeface="Arial"/>
-              <a:cs typeface="Arial"/>
-              <a:sym typeface="Arial"/>
-            </a:endParaRPr>
-          </a:p>
-          <a:p>
-            <a:pPr indent="-293211" lvl="1" marL="914400" rtl="0" algn="l">
-              <a:spcBef>
-                <a:spcPts val="0"/>
-              </a:spcBef>
-              <a:spcAft>
-                <a:spcPts val="0"/>
-              </a:spcAft>
-              <a:buClr>
-                <a:srgbClr val="000000"/>
-              </a:buClr>
-              <a:buSzPct val="100000"/>
-              <a:buFont typeface="Arial"/>
-              <a:buChar char="○"/>
-            </a:pPr>
-            <a:r>
-              <a:rPr lang="fr">
-                <a:solidFill>
-                  <a:srgbClr val="000000"/>
-                </a:solidFill>
-                <a:latin typeface="Arial"/>
-                <a:ea typeface="Arial"/>
-                <a:cs typeface="Arial"/>
-                <a:sym typeface="Arial"/>
-              </a:rPr>
-              <a:t>Implement sampling: workers send sample data to the master.</a:t>
-            </a:r>
-            <a:endParaRPr>
-              <a:solidFill>
-                <a:srgbClr val="000000"/>
-              </a:solidFill>
-              <a:latin typeface="Arial"/>
-              <a:ea typeface="Arial"/>
-              <a:cs typeface="Arial"/>
-              <a:sym typeface="Arial"/>
-            </a:endParaRPr>
-          </a:p>
-          <a:p>
-            <a:pPr indent="-293211" lvl="0" marL="457200" rtl="0" algn="l">
-              <a:spcBef>
-                <a:spcPts val="0"/>
-              </a:spcBef>
-              <a:spcAft>
-                <a:spcPts val="0"/>
-              </a:spcAft>
-              <a:buClr>
-                <a:srgbClr val="000000"/>
-              </a:buClr>
-              <a:buSzPct val="100000"/>
-              <a:buFont typeface="Arial"/>
-              <a:buChar char="●"/>
-            </a:pPr>
-            <a:r>
-              <a:rPr b="1" lang="fr" sz="1100">
-                <a:solidFill>
-                  <a:srgbClr val="000000"/>
-                </a:solidFill>
-                <a:latin typeface="Arial"/>
-                <a:ea typeface="Arial"/>
-                <a:cs typeface="Arial"/>
-                <a:sym typeface="Arial"/>
-              </a:rPr>
-              <a:t>Week 4:</a:t>
-            </a:r>
-            <a:endParaRPr b="1" sz="1100">
-              <a:solidFill>
-                <a:srgbClr val="000000"/>
-              </a:solidFill>
-              <a:latin typeface="Arial"/>
-              <a:ea typeface="Arial"/>
-              <a:cs typeface="Arial"/>
-              <a:sym typeface="Arial"/>
-            </a:endParaRPr>
-          </a:p>
-          <a:p>
-            <a:pPr indent="-293211" lvl="1" marL="914400" rtl="0" algn="l">
-              <a:spcBef>
-                <a:spcPts val="0"/>
-              </a:spcBef>
-              <a:spcAft>
-                <a:spcPts val="0"/>
-              </a:spcAft>
-              <a:buClr>
-                <a:srgbClr val="000000"/>
-              </a:buClr>
-              <a:buSzPct val="100000"/>
-              <a:buFont typeface="Arial"/>
-              <a:buChar char="○"/>
-            </a:pPr>
-            <a:r>
-              <a:rPr lang="fr">
-                <a:solidFill>
-                  <a:srgbClr val="000000"/>
-                </a:solidFill>
-                <a:latin typeface="Arial"/>
-                <a:ea typeface="Arial"/>
-                <a:cs typeface="Arial"/>
-                <a:sym typeface="Arial"/>
-              </a:rPr>
-              <a:t>Design the system.</a:t>
-            </a:r>
-            <a:endParaRPr>
-              <a:solidFill>
-                <a:srgbClr val="000000"/>
-              </a:solidFill>
-              <a:latin typeface="Arial"/>
-              <a:ea typeface="Arial"/>
-              <a:cs typeface="Arial"/>
-              <a:sym typeface="Arial"/>
-            </a:endParaRPr>
-          </a:p>
-          <a:p>
-            <a:pPr indent="-293211" lvl="0" marL="457200" rtl="0" algn="l">
-              <a:spcBef>
-                <a:spcPts val="0"/>
-              </a:spcBef>
-              <a:spcAft>
-                <a:spcPts val="0"/>
-              </a:spcAft>
-              <a:buClr>
-                <a:srgbClr val="000000"/>
-              </a:buClr>
-              <a:buSzPct val="100000"/>
-              <a:buFont typeface="Arial"/>
-              <a:buChar char="●"/>
-            </a:pPr>
-            <a:r>
-              <a:rPr b="1" lang="fr" sz="1100">
-                <a:solidFill>
-                  <a:srgbClr val="000000"/>
-                </a:solidFill>
-                <a:latin typeface="Arial"/>
-                <a:ea typeface="Arial"/>
-                <a:cs typeface="Arial"/>
-                <a:sym typeface="Arial"/>
-              </a:rPr>
-              <a:t>Week 5:</a:t>
-            </a:r>
-            <a:endParaRPr b="1" sz="1100">
-              <a:solidFill>
-                <a:srgbClr val="000000"/>
-              </a:solidFill>
-              <a:latin typeface="Arial"/>
-              <a:ea typeface="Arial"/>
-              <a:cs typeface="Arial"/>
-              <a:sym typeface="Arial"/>
-            </a:endParaRPr>
-          </a:p>
-          <a:p>
-            <a:pPr indent="-293211" lvl="1" marL="914400" rtl="0" algn="l">
-              <a:spcBef>
-                <a:spcPts val="0"/>
-              </a:spcBef>
-              <a:spcAft>
-                <a:spcPts val="0"/>
-              </a:spcAft>
-              <a:buClr>
-                <a:srgbClr val="000000"/>
-              </a:buClr>
-              <a:buSzPct val="100000"/>
-              <a:buFont typeface="Arial"/>
-              <a:buChar char="○"/>
-            </a:pPr>
-            <a:r>
-              <a:rPr lang="fr">
-                <a:solidFill>
-                  <a:srgbClr val="000000"/>
-                </a:solidFill>
-                <a:latin typeface="Arial"/>
-                <a:ea typeface="Arial"/>
-                <a:cs typeface="Arial"/>
-                <a:sym typeface="Arial"/>
-              </a:rPr>
-              <a:t>Master distributes partition data to workers.</a:t>
-            </a:r>
-            <a:endParaRPr>
-              <a:solidFill>
-                <a:srgbClr val="000000"/>
-              </a:solidFill>
-              <a:latin typeface="Arial"/>
-              <a:ea typeface="Arial"/>
-              <a:cs typeface="Arial"/>
-              <a:sym typeface="Arial"/>
-            </a:endParaRPr>
-          </a:p>
-          <a:p>
-            <a:pPr indent="-293211" lvl="1" marL="914400" rtl="0" algn="l">
-              <a:spcBef>
-                <a:spcPts val="0"/>
-              </a:spcBef>
-              <a:spcAft>
-                <a:spcPts val="0"/>
-              </a:spcAft>
-              <a:buClr>
-                <a:srgbClr val="000000"/>
-              </a:buClr>
-              <a:buSzPct val="100000"/>
-              <a:buFont typeface="Arial"/>
-              <a:buChar char="○"/>
-            </a:pPr>
-            <a:r>
-              <a:rPr lang="fr">
-                <a:solidFill>
-                  <a:srgbClr val="000000"/>
-                </a:solidFill>
-                <a:latin typeface="Arial"/>
-                <a:ea typeface="Arial"/>
-                <a:cs typeface="Arial"/>
-                <a:sym typeface="Arial"/>
-              </a:rPr>
-              <a:t>Ensure master and workers run smoothly.</a:t>
-            </a:r>
-            <a:endParaRPr/>
-          </a:p>
-        </p:txBody>
-      </p:sp>
-      <p:sp>
-        <p:nvSpPr>
-          <p:cNvPr id="326" name="Google Shape;326;p20"/>
-          <p:cNvSpPr txBox="1"/>
-          <p:nvPr>
-            <p:ph idx="1" type="body"/>
-          </p:nvPr>
-        </p:nvSpPr>
-        <p:spPr>
-          <a:xfrm>
-            <a:off x="4783550" y="1822075"/>
-            <a:ext cx="3840900" cy="2541600"/>
-          </a:xfrm>
-          <a:prstGeom prst="rect">
-            <a:avLst/>
-          </a:prstGeom>
-        </p:spPr>
-        <p:txBody>
-          <a:bodyPr anchorCtr="0" anchor="t" bIns="91425" lIns="91425" spcFirstLastPara="1" rIns="91425" wrap="square" tIns="91425">
-            <a:normAutofit/>
-          </a:bodyPr>
-          <a:lstStyle/>
-          <a:p>
-            <a:pPr indent="0" lvl="0" marL="0" rtl="0" algn="l">
-              <a:spcBef>
-                <a:spcPts val="1200"/>
-              </a:spcBef>
-              <a:spcAft>
-                <a:spcPts val="0"/>
-              </a:spcAft>
-              <a:buNone/>
-            </a:pPr>
-            <a:r>
-              <a:rPr b="1" lang="fr" sz="1100">
-                <a:solidFill>
-                  <a:srgbClr val="000000"/>
-                </a:solidFill>
-                <a:latin typeface="Arial"/>
-                <a:ea typeface="Arial"/>
-                <a:cs typeface="Arial"/>
-                <a:sym typeface="Arial"/>
-              </a:rPr>
-              <a:t>Milestone #3 (Week 6):</a:t>
-            </a:r>
-            <a:endParaRPr b="1" sz="1100">
-              <a:solidFill>
-                <a:srgbClr val="000000"/>
-              </a:solidFill>
-              <a:latin typeface="Arial"/>
-              <a:ea typeface="Arial"/>
-              <a:cs typeface="Arial"/>
-              <a:sym typeface="Arial"/>
-            </a:endParaRPr>
-          </a:p>
-          <a:p>
-            <a:pPr indent="-298450" lvl="0" marL="457200" rtl="0" algn="l">
-              <a:spcBef>
-                <a:spcPts val="1200"/>
-              </a:spcBef>
-              <a:spcAft>
-                <a:spcPts val="0"/>
-              </a:spcAft>
-              <a:buClr>
-                <a:srgbClr val="000000"/>
-              </a:buClr>
-              <a:buSzPts val="1100"/>
-              <a:buFont typeface="Arial"/>
-              <a:buChar char="●"/>
-            </a:pPr>
-            <a:r>
-              <a:rPr lang="fr" sz="1100">
-                <a:solidFill>
-                  <a:srgbClr val="000000"/>
-                </a:solidFill>
-                <a:latin typeface="Arial"/>
-                <a:ea typeface="Arial"/>
-                <a:cs typeface="Arial"/>
-                <a:sym typeface="Arial"/>
-              </a:rPr>
-              <a:t>Implement sorting/merging across workers.</a:t>
-            </a:r>
-            <a:endParaRPr sz="1100">
-              <a:solidFill>
-                <a:srgbClr val="000000"/>
-              </a:solidFill>
-              <a:latin typeface="Arial"/>
-              <a:ea typeface="Arial"/>
-              <a:cs typeface="Arial"/>
-              <a:sym typeface="Arial"/>
-            </a:endParaRPr>
-          </a:p>
-          <a:p>
-            <a:pPr indent="-298450" lvl="0" marL="457200" rtl="0" algn="l">
-              <a:spcBef>
-                <a:spcPts val="0"/>
-              </a:spcBef>
-              <a:spcAft>
-                <a:spcPts val="0"/>
-              </a:spcAft>
-              <a:buClr>
-                <a:srgbClr val="000000"/>
-              </a:buClr>
-              <a:buSzPts val="1100"/>
-              <a:buFont typeface="Arial"/>
-              <a:buChar char="●"/>
-            </a:pPr>
-            <a:r>
-              <a:rPr lang="fr" sz="1100">
-                <a:solidFill>
-                  <a:srgbClr val="000000"/>
-                </a:solidFill>
-                <a:latin typeface="Arial"/>
-                <a:ea typeface="Arial"/>
-                <a:cs typeface="Arial"/>
-                <a:sym typeface="Arial"/>
-              </a:rPr>
-              <a:t>Perform initial sorting/partitioning on worker nodes.</a:t>
-            </a:r>
-            <a:endParaRPr sz="1100">
-              <a:solidFill>
-                <a:srgbClr val="000000"/>
-              </a:solidFill>
-              <a:latin typeface="Arial"/>
-              <a:ea typeface="Arial"/>
-              <a:cs typeface="Arial"/>
-              <a:sym typeface="Arial"/>
-            </a:endParaRPr>
-          </a:p>
-          <a:p>
-            <a:pPr indent="-298450" lvl="0" marL="457200" rtl="0" algn="l">
-              <a:spcBef>
-                <a:spcPts val="0"/>
-              </a:spcBef>
-              <a:spcAft>
-                <a:spcPts val="0"/>
-              </a:spcAft>
-              <a:buClr>
-                <a:srgbClr val="000000"/>
-              </a:buClr>
-              <a:buSzPts val="1100"/>
-              <a:buFont typeface="Arial"/>
-              <a:buChar char="●"/>
-            </a:pPr>
-            <a:r>
-              <a:rPr lang="fr" sz="1100">
-                <a:solidFill>
-                  <a:srgbClr val="000000"/>
-                </a:solidFill>
-                <a:latin typeface="Arial"/>
-                <a:ea typeface="Arial"/>
-                <a:cs typeface="Arial"/>
-                <a:sym typeface="Arial"/>
-              </a:rPr>
-              <a:t>Prepare progress slides and presentation (Week 6).</a:t>
-            </a:r>
-            <a:endParaRPr sz="1100">
-              <a:solidFill>
-                <a:srgbClr val="000000"/>
-              </a:solidFill>
-              <a:latin typeface="Arial"/>
-              <a:ea typeface="Arial"/>
-              <a:cs typeface="Arial"/>
-              <a:sym typeface="Arial"/>
-            </a:endParaRPr>
-          </a:p>
-          <a:p>
-            <a:pPr indent="0" lvl="0" marL="0" rtl="0" algn="l">
-              <a:spcBef>
-                <a:spcPts val="1200"/>
-              </a:spcBef>
-              <a:spcAft>
-                <a:spcPts val="0"/>
-              </a:spcAft>
-              <a:buNone/>
-            </a:pPr>
-            <a:r>
-              <a:rPr b="1" lang="fr" sz="1100">
-                <a:solidFill>
-                  <a:srgbClr val="000000"/>
-                </a:solidFill>
-                <a:latin typeface="Arial"/>
-                <a:ea typeface="Arial"/>
-                <a:cs typeface="Arial"/>
-                <a:sym typeface="Arial"/>
-              </a:rPr>
-              <a:t>Milestone #4 (Weeks 7-8):</a:t>
-            </a:r>
-            <a:endParaRPr b="1" sz="1100">
-              <a:solidFill>
-                <a:srgbClr val="000000"/>
-              </a:solidFill>
-              <a:latin typeface="Arial"/>
-              <a:ea typeface="Arial"/>
-              <a:cs typeface="Arial"/>
-              <a:sym typeface="Arial"/>
-            </a:endParaRPr>
-          </a:p>
-          <a:p>
-            <a:pPr indent="-298450" lvl="0" marL="457200" rtl="0" algn="l">
-              <a:spcBef>
-                <a:spcPts val="1200"/>
-              </a:spcBef>
-              <a:spcAft>
-                <a:spcPts val="0"/>
-              </a:spcAft>
-              <a:buClr>
-                <a:srgbClr val="000000"/>
-              </a:buClr>
-              <a:buSzPts val="1100"/>
-              <a:buFont typeface="Arial"/>
-              <a:buChar char="●"/>
-            </a:pPr>
-            <a:r>
-              <a:rPr lang="fr" sz="1100">
-                <a:solidFill>
-                  <a:srgbClr val="000000"/>
-                </a:solidFill>
-                <a:latin typeface="Arial"/>
-                <a:ea typeface="Arial"/>
-                <a:cs typeface="Arial"/>
-                <a:sym typeface="Arial"/>
-              </a:rPr>
-              <a:t>Optimize parallelism (use multiple cores).</a:t>
-            </a:r>
-            <a:endParaRPr sz="1100">
-              <a:solidFill>
-                <a:srgbClr val="000000"/>
-              </a:solidFill>
-              <a:latin typeface="Arial"/>
-              <a:ea typeface="Arial"/>
-              <a:cs typeface="Arial"/>
-              <a:sym typeface="Arial"/>
-            </a:endParaRPr>
-          </a:p>
-          <a:p>
-            <a:pPr indent="-298450" lvl="0" marL="457200" rtl="0" algn="l">
-              <a:spcBef>
-                <a:spcPts val="0"/>
-              </a:spcBef>
-              <a:spcAft>
-                <a:spcPts val="0"/>
-              </a:spcAft>
-              <a:buClr>
-                <a:srgbClr val="000000"/>
-              </a:buClr>
-              <a:buSzPts val="1100"/>
-              <a:buFont typeface="Arial"/>
-              <a:buChar char="●"/>
-            </a:pPr>
-            <a:r>
-              <a:rPr lang="fr" sz="1100">
-                <a:solidFill>
-                  <a:srgbClr val="000000"/>
-                </a:solidFill>
-                <a:latin typeface="Arial"/>
-                <a:ea typeface="Arial"/>
-                <a:cs typeface="Arial"/>
-                <a:sym typeface="Arial"/>
-              </a:rPr>
-              <a:t>Finalize distributed sorting/merging processes.</a:t>
-            </a:r>
-            <a:endParaRPr sz="1100">
-              <a:solidFill>
-                <a:srgbClr val="000000"/>
-              </a:solidFill>
-              <a:latin typeface="Arial"/>
-              <a:ea typeface="Arial"/>
-              <a:cs typeface="Arial"/>
-              <a:sym typeface="Arial"/>
-            </a:endParaRPr>
-          </a:p>
-          <a:p>
-            <a:pPr indent="-298450" lvl="0" marL="457200" rtl="0" algn="l">
-              <a:spcBef>
-                <a:spcPts val="0"/>
-              </a:spcBef>
-              <a:spcAft>
-                <a:spcPts val="0"/>
-              </a:spcAft>
-              <a:buClr>
-                <a:srgbClr val="000000"/>
-              </a:buClr>
-              <a:buSzPts val="1100"/>
-              <a:buFont typeface="Arial"/>
-              <a:buChar char="●"/>
-            </a:pPr>
-            <a:r>
-              <a:rPr lang="fr" sz="1100">
-                <a:solidFill>
-                  <a:srgbClr val="000000"/>
-                </a:solidFill>
-                <a:latin typeface="Arial"/>
-                <a:ea typeface="Arial"/>
-                <a:cs typeface="Arial"/>
-                <a:sym typeface="Arial"/>
-              </a:rPr>
-              <a:t>Conduct final testing and submit by </a:t>
-            </a:r>
-            <a:r>
-              <a:rPr b="1" lang="fr" sz="1100">
-                <a:solidFill>
-                  <a:srgbClr val="000000"/>
-                </a:solidFill>
-                <a:latin typeface="Arial"/>
-                <a:ea typeface="Arial"/>
-                <a:cs typeface="Arial"/>
-                <a:sym typeface="Arial"/>
-              </a:rPr>
-              <a:t>Dec 8</a:t>
-            </a:r>
-            <a:r>
-              <a:rPr lang="fr" sz="1100">
-                <a:solidFill>
-                  <a:srgbClr val="000000"/>
-                </a:solidFill>
-                <a:latin typeface="Arial"/>
-                <a:ea typeface="Arial"/>
-                <a:cs typeface="Arial"/>
-                <a:sym typeface="Arial"/>
-              </a:rPr>
-              <a:t>.</a:t>
-            </a:r>
-            <a:endParaRPr b="1" sz="1300">
-              <a:solidFill>
-                <a:srgbClr val="000000"/>
-              </a:solidFill>
-              <a:latin typeface="Arial"/>
-              <a:ea typeface="Arial"/>
-              <a:cs typeface="Arial"/>
-              <a:sym typeface="Arial"/>
-            </a:endParaRPr>
-          </a:p>
-        </p:txBody>
-      </p:sp>
-    </p:spTree>
-  </p:cSld>
-  <p:clrMapOvr>
-    <a:masterClrMapping/>
-  </p:clrMapOvr>
-</p:sld>
-</file>
-
-<file path=ppt/slides/slide9.xml><?xml version="1.0" encoding="utf-8"?>
-<p:sld xmlns:a="http://schemas.openxmlformats.org/drawingml/2006/main" xmlns:r="http://schemas.openxmlformats.org/officeDocument/2006/relationships" xmlns:mc="http://schemas.openxmlformats.org/markup-compatibility/2006" xmlns:mv="urn:schemas-microsoft-com:mac:vml" xmlns:p="http://schemas.openxmlformats.org/presentationml/2006/main" xmlns:c="http://schemas.openxmlformats.org/drawingml/2006/chart" xmlns:dgm="http://schemas.openxmlformats.org/drawingml/2006/diagram" xmlns:o="urn:schemas-microsoft-com:office:office" xmlns:v="urn:schemas-microsoft-com:vml" xmlns:pvml="urn:schemas-microsoft-com:office:powerpoint" xmlns:com="http://schemas.openxmlformats.org/drawingml/2006/compatibility" xmlns:p14="http://schemas.microsoft.com/office/powerpoint/2010/main" xmlns:p15="http://schemas.microsoft.com/office/powerpoint/2012/main" xmlns:ahyp="http://schemas.microsoft.com/office/drawing/2018/hyperlinkcolor">
-  <p:cSld>
-    <p:spTree>
-      <p:nvGrpSpPr>
-        <p:cNvPr id="330" name="Shape 330"/>
-        <p:cNvGrpSpPr/>
-        <p:nvPr/>
-      </p:nvGrpSpPr>
-      <p:grpSpPr>
-        <a:xfrm>
-          <a:off x="0" y="0"/>
-          <a:ext cx="0" cy="0"/>
-          <a:chOff x="0" y="0"/>
-          <a:chExt cx="0" cy="0"/>
-        </a:xfrm>
-      </p:grpSpPr>
-      <p:sp>
-        <p:nvSpPr>
-          <p:cNvPr id="331" name="Google Shape;331;p21"/>
-          <p:cNvSpPr txBox="1"/>
-          <p:nvPr>
-            <p:ph type="title"/>
-          </p:nvPr>
-        </p:nvSpPr>
-        <p:spPr>
-          <a:xfrm>
-            <a:off x="1303800" y="598575"/>
-            <a:ext cx="7030500" cy="999300"/>
-          </a:xfrm>
-          <a:prstGeom prst="rect">
-            <a:avLst/>
-          </a:prstGeom>
-        </p:spPr>
-        <p:txBody>
-          <a:bodyPr anchorCtr="0" anchor="t" bIns="91425" lIns="91425" spcFirstLastPara="1" rIns="91425" wrap="square" tIns="91425">
-            <a:normAutofit/>
-          </a:bodyPr>
-          <a:lstStyle/>
-          <a:p>
-            <a:pPr indent="0" lvl="0" marL="0" rtl="0" algn="l">
-              <a:spcBef>
-                <a:spcPts val="0"/>
-              </a:spcBef>
-              <a:spcAft>
-                <a:spcPts val="0"/>
-              </a:spcAft>
-              <a:buNone/>
-            </a:pPr>
-            <a:r>
-              <a:rPr lang="fr" sz="2600">
-                <a:solidFill>
-                  <a:srgbClr val="0000FF"/>
-                </a:solidFill>
-              </a:rPr>
               <a:t>Design</a:t>
             </a:r>
             <a:endParaRPr sz="2600">
@@ -20172,7 +18838,7 @@
       </p:sp>
       <p:pic>
         <p:nvPicPr>
-          <p:cNvPr id="332" name="Google Shape;332;p21"/>
+          <p:cNvPr id="327" name="Google Shape;327;p20"/>
           <p:cNvPicPr preferRelativeResize="0"/>
           <p:nvPr/>
         </p:nvPicPr>
@@ -20200,7 +18866,7 @@
       </p:pic>
       <p:pic>
         <p:nvPicPr>
-          <p:cNvPr id="333" name="Google Shape;333;p21"/>
+          <p:cNvPr id="328" name="Google Shape;328;p20"/>
           <p:cNvPicPr preferRelativeResize="0"/>
           <p:nvPr/>
         </p:nvPicPr>
@@ -20226,6 +18892,428 @@
           </a:ln>
         </p:spPr>
       </p:pic>
+    </p:spTree>
+  </p:cSld>
+  <p:clrMapOvr>
+    <a:masterClrMapping/>
+  </p:clrMapOvr>
+</p:sld>
+</file>
+
+<file path=ppt/slides/slide9.xml><?xml version="1.0" encoding="utf-8"?>
+<p:sld xmlns:a="http://schemas.openxmlformats.org/drawingml/2006/main" xmlns:r="http://schemas.openxmlformats.org/officeDocument/2006/relationships" xmlns:mc="http://schemas.openxmlformats.org/markup-compatibility/2006" xmlns:mv="urn:schemas-microsoft-com:mac:vml" xmlns:p="http://schemas.openxmlformats.org/presentationml/2006/main" xmlns:c="http://schemas.openxmlformats.org/drawingml/2006/chart" xmlns:dgm="http://schemas.openxmlformats.org/drawingml/2006/diagram" xmlns:o="urn:schemas-microsoft-com:office:office" xmlns:v="urn:schemas-microsoft-com:vml" xmlns:pvml="urn:schemas-microsoft-com:office:powerpoint" xmlns:com="http://schemas.openxmlformats.org/drawingml/2006/compatibility" xmlns:p14="http://schemas.microsoft.com/office/powerpoint/2010/main" xmlns:p15="http://schemas.microsoft.com/office/powerpoint/2012/main" xmlns:ahyp="http://schemas.microsoft.com/office/drawing/2018/hyperlinkcolor">
+  <p:cSld>
+    <p:spTree>
+      <p:nvGrpSpPr>
+        <p:cNvPr id="332" name="Shape 332"/>
+        <p:cNvGrpSpPr/>
+        <p:nvPr/>
+      </p:nvGrpSpPr>
+      <p:grpSpPr>
+        <a:xfrm>
+          <a:off x="0" y="0"/>
+          <a:ext cx="0" cy="0"/>
+          <a:chOff x="0" y="0"/>
+          <a:chExt cx="0" cy="0"/>
+        </a:xfrm>
+      </p:grpSpPr>
+      <p:pic>
+        <p:nvPicPr>
+          <p:cNvPr id="333" name="Google Shape;333;p21"/>
+          <p:cNvPicPr preferRelativeResize="0"/>
+          <p:nvPr/>
+        </p:nvPicPr>
+        <p:blipFill>
+          <a:blip r:embed="rId3">
+            <a:alphaModFix/>
+          </a:blip>
+          <a:stretch>
+            <a:fillRect/>
+          </a:stretch>
+        </p:blipFill>
+        <p:spPr>
+          <a:xfrm>
+            <a:off x="111788" y="517725"/>
+            <a:ext cx="1762125" cy="1028700"/>
+          </a:xfrm>
+          <a:prstGeom prst="rect">
+            <a:avLst/>
+          </a:prstGeom>
+          <a:noFill/>
+          <a:ln>
+            <a:noFill/>
+          </a:ln>
+        </p:spPr>
+      </p:pic>
+      <p:sp>
+        <p:nvSpPr>
+          <p:cNvPr id="334" name="Google Shape;334;p21"/>
+          <p:cNvSpPr txBox="1"/>
+          <p:nvPr>
+            <p:ph type="title"/>
+          </p:nvPr>
+        </p:nvSpPr>
+        <p:spPr>
+          <a:xfrm>
+            <a:off x="428075" y="598575"/>
+            <a:ext cx="4294200" cy="999300"/>
+          </a:xfrm>
+          <a:prstGeom prst="rect">
+            <a:avLst/>
+          </a:prstGeom>
+        </p:spPr>
+        <p:txBody>
+          <a:bodyPr anchorCtr="0" anchor="t" bIns="91425" lIns="91425" spcFirstLastPara="1" rIns="91425" wrap="square" tIns="91425">
+            <a:normAutofit/>
+          </a:bodyPr>
+          <a:lstStyle/>
+          <a:p>
+            <a:pPr indent="0" lvl="0" marL="0" rtl="0" algn="l">
+              <a:spcBef>
+                <a:spcPts val="0"/>
+              </a:spcBef>
+              <a:spcAft>
+                <a:spcPts val="0"/>
+              </a:spcAft>
+              <a:buNone/>
+            </a:pPr>
+            <a:r>
+              <a:rPr lang="fr" sz="2600">
+                <a:solidFill>
+                  <a:srgbClr val="0000FF"/>
+                </a:solidFill>
+              </a:rPr>
+              <a:t>Master Design Details</a:t>
+            </a:r>
+            <a:endParaRPr sz="2600">
+              <a:solidFill>
+                <a:srgbClr val="0000FF"/>
+              </a:solidFill>
+            </a:endParaRPr>
+          </a:p>
+        </p:txBody>
+      </p:sp>
+      <p:sp>
+        <p:nvSpPr>
+          <p:cNvPr id="335" name="Google Shape;335;p21"/>
+          <p:cNvSpPr txBox="1"/>
+          <p:nvPr>
+            <p:ph idx="1" type="body"/>
+          </p:nvPr>
+        </p:nvSpPr>
+        <p:spPr>
+          <a:xfrm>
+            <a:off x="428075" y="1476375"/>
+            <a:ext cx="3473700" cy="3524400"/>
+          </a:xfrm>
+          <a:prstGeom prst="rect">
+            <a:avLst/>
+          </a:prstGeom>
+        </p:spPr>
+        <p:txBody>
+          <a:bodyPr anchorCtr="0" anchor="t" bIns="91425" lIns="91425" spcFirstLastPara="1" rIns="91425" wrap="square" tIns="91425">
+            <a:normAutofit/>
+          </a:bodyPr>
+          <a:lstStyle/>
+          <a:p>
+            <a:pPr indent="0" lvl="0" marL="0" rtl="0" algn="l">
+              <a:spcBef>
+                <a:spcPts val="0"/>
+              </a:spcBef>
+              <a:spcAft>
+                <a:spcPts val="0"/>
+              </a:spcAft>
+              <a:buNone/>
+            </a:pPr>
+            <a:r>
+              <a:rPr lang="fr"/>
+              <a:t>Expected Master responsibilities:</a:t>
+            </a:r>
+            <a:endParaRPr/>
+          </a:p>
+          <a:p>
+            <a:pPr indent="-311150" lvl="0" marL="457200" rtl="0" algn="l">
+              <a:spcBef>
+                <a:spcPts val="1200"/>
+              </a:spcBef>
+              <a:spcAft>
+                <a:spcPts val="0"/>
+              </a:spcAft>
+              <a:buSzPts val="1300"/>
+              <a:buChar char="●"/>
+            </a:pPr>
+            <a:r>
+              <a:rPr lang="fr"/>
+              <a:t>ordering workers</a:t>
+            </a:r>
+            <a:endParaRPr/>
+          </a:p>
+          <a:p>
+            <a:pPr indent="-311150" lvl="0" marL="457200" rtl="0" algn="l">
+              <a:spcBef>
+                <a:spcPts val="0"/>
+              </a:spcBef>
+              <a:spcAft>
+                <a:spcPts val="0"/>
+              </a:spcAft>
+              <a:buSzPts val="1300"/>
+              <a:buChar char="●"/>
+            </a:pPr>
+            <a:r>
+              <a:rPr lang="fr"/>
+              <a:t>manage the exchange between workers</a:t>
+            </a:r>
+            <a:endParaRPr/>
+          </a:p>
+          <a:p>
+            <a:pPr indent="0" lvl="0" marL="0" rtl="0" algn="l">
+              <a:spcBef>
+                <a:spcPts val="1200"/>
+              </a:spcBef>
+              <a:spcAft>
+                <a:spcPts val="0"/>
+              </a:spcAft>
+              <a:buNone/>
+            </a:pPr>
+            <a:r>
+              <a:rPr lang="fr"/>
+              <a:t>Current progress: </a:t>
+            </a:r>
+            <a:endParaRPr/>
+          </a:p>
+          <a:p>
+            <a:pPr indent="-311150" lvl="0" marL="457200" rtl="0" algn="l">
+              <a:spcBef>
+                <a:spcPts val="1200"/>
+              </a:spcBef>
+              <a:spcAft>
+                <a:spcPts val="0"/>
+              </a:spcAft>
+              <a:buSzPts val="1300"/>
+              <a:buChar char="●"/>
+            </a:pPr>
+            <a:r>
+              <a:rPr lang="fr"/>
+              <a:t>Started coding for communication,</a:t>
+            </a:r>
+            <a:endParaRPr/>
+          </a:p>
+          <a:p>
+            <a:pPr indent="-311150" lvl="0" marL="457200" rtl="0" algn="l">
+              <a:spcBef>
+                <a:spcPts val="0"/>
+              </a:spcBef>
+              <a:spcAft>
+                <a:spcPts val="0"/>
+              </a:spcAft>
+              <a:buSzPts val="1300"/>
+              <a:buChar char="●"/>
+            </a:pPr>
+            <a:r>
+              <a:rPr lang="fr"/>
+              <a:t>We need the connection </a:t>
+            </a:r>
+            <a:r>
+              <a:rPr lang="fr"/>
+              <a:t>with the workers </a:t>
+            </a:r>
+            <a:r>
+              <a:rPr lang="fr"/>
+              <a:t>to be established to debug and implement the role according to our design.</a:t>
+            </a:r>
+            <a:endParaRPr/>
+          </a:p>
+          <a:p>
+            <a:pPr indent="0" lvl="0" marL="0" rtl="0" algn="l">
+              <a:spcBef>
+                <a:spcPts val="1200"/>
+              </a:spcBef>
+              <a:spcAft>
+                <a:spcPts val="1200"/>
+              </a:spcAft>
+              <a:buNone/>
+            </a:pPr>
+            <a:r>
+              <a:rPr lang="fr"/>
+              <a:t>Question: is the </a:t>
+            </a:r>
+            <a:r>
+              <a:rPr lang="fr" u="sng"/>
+              <a:t>master our computer</a:t>
+            </a:r>
+            <a:r>
+              <a:rPr lang="fr"/>
+              <a:t> or one of the machines? </a:t>
+            </a:r>
+            <a:endParaRPr/>
+          </a:p>
+        </p:txBody>
+      </p:sp>
+      <p:sp>
+        <p:nvSpPr>
+          <p:cNvPr id="336" name="Google Shape;336;p21"/>
+          <p:cNvSpPr txBox="1"/>
+          <p:nvPr>
+            <p:ph idx="1" type="body"/>
+          </p:nvPr>
+        </p:nvSpPr>
+        <p:spPr>
+          <a:xfrm>
+            <a:off x="4572000" y="1990050"/>
+            <a:ext cx="4294200" cy="2541600"/>
+          </a:xfrm>
+          <a:prstGeom prst="rect">
+            <a:avLst/>
+          </a:prstGeom>
+        </p:spPr>
+        <p:txBody>
+          <a:bodyPr anchorCtr="0" anchor="t" bIns="91425" lIns="91425" spcFirstLastPara="1" rIns="91425" wrap="square" tIns="91425">
+            <a:normAutofit/>
+          </a:bodyPr>
+          <a:lstStyle/>
+          <a:p>
+            <a:pPr indent="0" lvl="0" marL="0" rtl="0" algn="l">
+              <a:spcBef>
+                <a:spcPts val="0"/>
+              </a:spcBef>
+              <a:spcAft>
+                <a:spcPts val="0"/>
+              </a:spcAft>
+              <a:buNone/>
+            </a:pPr>
+            <a:r>
+              <a:rPr lang="fr"/>
+              <a:t>Expected worker responsibilities:</a:t>
+            </a:r>
+            <a:endParaRPr/>
+          </a:p>
+          <a:p>
+            <a:pPr indent="-311150" lvl="0" marL="457200" rtl="0" algn="l">
+              <a:spcBef>
+                <a:spcPts val="1200"/>
+              </a:spcBef>
+              <a:spcAft>
+                <a:spcPts val="0"/>
+              </a:spcAft>
+              <a:buSzPts val="1300"/>
+              <a:buChar char="●"/>
+            </a:pPr>
+            <a:r>
+              <a:rPr lang="fr"/>
+              <a:t>Presorting and sorting data</a:t>
+            </a:r>
+            <a:endParaRPr/>
+          </a:p>
+          <a:p>
+            <a:pPr indent="-311150" lvl="0" marL="457200" rtl="0" algn="l">
+              <a:spcBef>
+                <a:spcPts val="0"/>
+              </a:spcBef>
+              <a:spcAft>
+                <a:spcPts val="0"/>
+              </a:spcAft>
+              <a:buSzPts val="1300"/>
+              <a:buChar char="●"/>
+            </a:pPr>
+            <a:r>
+              <a:rPr lang="fr"/>
+              <a:t>Exchanging data with other workers</a:t>
+            </a:r>
+            <a:endParaRPr/>
+          </a:p>
+          <a:p>
+            <a:pPr indent="-311150" lvl="0" marL="457200" rtl="0" algn="l">
+              <a:spcBef>
+                <a:spcPts val="0"/>
+              </a:spcBef>
+              <a:spcAft>
+                <a:spcPts val="0"/>
+              </a:spcAft>
+              <a:buSzPts val="1300"/>
+              <a:buChar char="●"/>
+            </a:pPr>
+            <a:r>
+              <a:rPr lang="fr"/>
+              <a:t>Give feedback to master when finishing every step</a:t>
+            </a:r>
+            <a:endParaRPr/>
+          </a:p>
+        </p:txBody>
+      </p:sp>
+      <p:sp>
+        <p:nvSpPr>
+          <p:cNvPr id="337" name="Google Shape;337;p21"/>
+          <p:cNvSpPr txBox="1"/>
+          <p:nvPr>
+            <p:ph type="title"/>
+          </p:nvPr>
+        </p:nvSpPr>
+        <p:spPr>
+          <a:xfrm>
+            <a:off x="4572000" y="598575"/>
+            <a:ext cx="4294200" cy="999300"/>
+          </a:xfrm>
+          <a:prstGeom prst="rect">
+            <a:avLst/>
+          </a:prstGeom>
+        </p:spPr>
+        <p:txBody>
+          <a:bodyPr anchorCtr="0" anchor="t" bIns="91425" lIns="91425" spcFirstLastPara="1" rIns="91425" wrap="square" tIns="91425">
+            <a:normAutofit/>
+          </a:bodyPr>
+          <a:lstStyle/>
+          <a:p>
+            <a:pPr indent="0" lvl="0" marL="0" rtl="0" algn="l">
+              <a:spcBef>
+                <a:spcPts val="0"/>
+              </a:spcBef>
+              <a:spcAft>
+                <a:spcPts val="0"/>
+              </a:spcAft>
+              <a:buNone/>
+            </a:pPr>
+            <a:r>
+              <a:rPr lang="fr" sz="2600">
+                <a:solidFill>
+                  <a:srgbClr val="0000FF"/>
+                </a:solidFill>
+              </a:rPr>
+              <a:t>Worker Design Details:</a:t>
+            </a:r>
+            <a:endParaRPr sz="2600">
+              <a:solidFill>
+                <a:srgbClr val="0000FF"/>
+              </a:solidFill>
+            </a:endParaRPr>
+          </a:p>
+        </p:txBody>
+      </p:sp>
+      <p:cxnSp>
+        <p:nvCxnSpPr>
+          <p:cNvPr id="338" name="Google Shape;338;p21"/>
+          <p:cNvCxnSpPr/>
+          <p:nvPr/>
+        </p:nvCxnSpPr>
+        <p:spPr>
+          <a:xfrm>
+            <a:off x="4327700" y="472900"/>
+            <a:ext cx="33600" cy="4157400"/>
+          </a:xfrm>
+          <a:prstGeom prst="straightConnector1">
+            <a:avLst/>
+          </a:prstGeom>
+          <a:noFill/>
+          <a:ln cap="flat" cmpd="sng" w="9525">
+            <a:solidFill>
+              <a:schemeClr val="dk2"/>
+            </a:solidFill>
+            <a:prstDash val="solid"/>
+            <a:round/>
+            <a:headEnd len="med" w="med" type="none"/>
+            <a:tailEnd len="med" w="med" type="none"/>
+          </a:ln>
+        </p:spPr>
+      </p:cxnSp>
     </p:spTree>
   </p:cSld>
   <p:clrMapOvr>

</xml_diff>